<commit_message>
update video 4 slide
</commit_message>
<xml_diff>
--- a/Data_types and variables/Datatypes_variables.pptx
+++ b/Data_types and variables/Datatypes_variables.pptx
@@ -6,6 +6,8 @@
   </p:sldMasterIdLst>
   <p:sldIdLst>
     <p:sldId id="256" r:id="rId2"/>
+    <p:sldId id="257" r:id="rId3"/>
+    <p:sldId id="258" r:id="rId4"/>
   </p:sldIdLst>
   <p:sldSz cx="12192000" cy="6858000"/>
   <p:notesSz cx="6858000" cy="9144000"/>
@@ -104,6 +106,11 @@
       </a:defRPr>
     </a:lvl9pPr>
   </p:defaultTextStyle>
+  <p:extLst>
+    <p:ext uri="{EFAFB233-063F-42B5-8137-9DF3F51BA10A}">
+      <p15:sldGuideLst xmlns:p15="http://schemas.microsoft.com/office/powerpoint/2012/main"/>
+    </p:ext>
+  </p:extLst>
 </p:presentation>
 </file>
 
@@ -3378,7 +3385,10 @@
           <a:bodyPr/>
           <a:lstStyle/>
           <a:p>
-            <a:endParaRPr lang="en-US" dirty="0"/>
+            <a:r>
+              <a:rPr lang="en-US" dirty="0"/>
+              <a:t>Datatypes and Variables</a:t>
+            </a:r>
           </a:p>
         </p:txBody>
       </p:sp>
@@ -3403,14 +3413,1911 @@
           <a:bodyPr/>
           <a:lstStyle/>
           <a:p>
-            <a:endParaRPr lang="en-US"/>
-          </a:p>
-        </p:txBody>
-      </p:sp>
+            <a:r>
+              <a:rPr lang="en-US" dirty="0"/>
+              <a:t>Kevin Lin</a:t>
+            </a:r>
+          </a:p>
+        </p:txBody>
+      </p:sp>
+      <p:pic>
+        <p:nvPicPr>
+          <p:cNvPr id="5" name="Picture 4">
+            <a:extLst>
+              <a:ext uri="{FF2B5EF4-FFF2-40B4-BE49-F238E27FC236}">
+                <a16:creationId xmlns:a16="http://schemas.microsoft.com/office/drawing/2014/main" id="{0650197D-C530-43BB-B91D-7903E0FD3421}"/>
+              </a:ext>
+            </a:extLst>
+          </p:cNvPr>
+          <p:cNvPicPr>
+            <a:picLocks noChangeAspect="1"/>
+          </p:cNvPicPr>
+          <p:nvPr/>
+        </p:nvPicPr>
+        <p:blipFill>
+          <a:blip r:embed="rId2"/>
+          <a:stretch>
+            <a:fillRect/>
+          </a:stretch>
+        </p:blipFill>
+        <p:spPr>
+          <a:xfrm>
+            <a:off x="6021779" y="1783080"/>
+            <a:ext cx="2286000" cy="2286000"/>
+          </a:xfrm>
+          <a:prstGeom prst="rect">
+            <a:avLst/>
+          </a:prstGeom>
+        </p:spPr>
+      </p:pic>
     </p:spTree>
     <p:extLst>
       <p:ext uri="{BB962C8B-B14F-4D97-AF65-F5344CB8AC3E}">
         <p14:creationId xmlns:p14="http://schemas.microsoft.com/office/powerpoint/2010/main" val="1317275645"/>
+      </p:ext>
+    </p:extLst>
+  </p:cSld>
+  <p:clrMapOvr>
+    <a:masterClrMapping/>
+  </p:clrMapOvr>
+</p:sld>
+</file>
+
+<file path=ppt/slides/slide2.xml><?xml version="1.0" encoding="utf-8"?>
+<p:sld xmlns:a="http://schemas.openxmlformats.org/drawingml/2006/main" xmlns:r="http://schemas.openxmlformats.org/officeDocument/2006/relationships" xmlns:p="http://schemas.openxmlformats.org/presentationml/2006/main">
+  <p:cSld>
+    <p:spTree>
+      <p:nvGrpSpPr>
+        <p:cNvPr id="1" name=""/>
+        <p:cNvGrpSpPr/>
+        <p:nvPr/>
+      </p:nvGrpSpPr>
+      <p:grpSpPr>
+        <a:xfrm>
+          <a:off x="0" y="0"/>
+          <a:ext cx="0" cy="0"/>
+          <a:chOff x="0" y="0"/>
+          <a:chExt cx="0" cy="0"/>
+        </a:xfrm>
+      </p:grpSpPr>
+      <p:sp>
+        <p:nvSpPr>
+          <p:cNvPr id="2" name="Title 1">
+            <a:extLst>
+              <a:ext uri="{FF2B5EF4-FFF2-40B4-BE49-F238E27FC236}">
+                <a16:creationId xmlns:a16="http://schemas.microsoft.com/office/drawing/2014/main" id="{A87CF849-F9C3-42D1-8911-91F93F7956E7}"/>
+              </a:ext>
+            </a:extLst>
+          </p:cNvPr>
+          <p:cNvSpPr>
+            <a:spLocks noGrp="1"/>
+          </p:cNvSpPr>
+          <p:nvPr>
+            <p:ph type="title"/>
+          </p:nvPr>
+        </p:nvSpPr>
+        <p:spPr/>
+        <p:txBody>
+          <a:bodyPr/>
+          <a:lstStyle/>
+          <a:p>
+            <a:r>
+              <a:rPr lang="en-US" dirty="0"/>
+              <a:t>Bits, bytes, and binary crash course</a:t>
+            </a:r>
+          </a:p>
+        </p:txBody>
+      </p:sp>
+      <p:sp>
+        <p:nvSpPr>
+          <p:cNvPr id="3" name="Content Placeholder 2">
+            <a:extLst>
+              <a:ext uri="{FF2B5EF4-FFF2-40B4-BE49-F238E27FC236}">
+                <a16:creationId xmlns:a16="http://schemas.microsoft.com/office/drawing/2014/main" id="{A52B0D49-F7AE-448F-B5A1-D79AB7E44DD9}"/>
+              </a:ext>
+            </a:extLst>
+          </p:cNvPr>
+          <p:cNvSpPr>
+            <a:spLocks noGrp="1"/>
+          </p:cNvSpPr>
+          <p:nvPr>
+            <p:ph idx="1"/>
+          </p:nvPr>
+        </p:nvSpPr>
+        <p:spPr/>
+        <p:txBody>
+          <a:bodyPr/>
+          <a:lstStyle/>
+          <a:p>
+            <a:r>
+              <a:rPr lang="en-US" dirty="0"/>
+              <a:t>A bit is the smallest unit of data in a computer. (0 or 1)</a:t>
+            </a:r>
+          </a:p>
+          <a:p>
+            <a:r>
+              <a:rPr lang="en-US" dirty="0"/>
+              <a:t>A byte = 8 bits, 2^8 = 256 possible combinations. Largest value = 255</a:t>
+            </a:r>
+          </a:p>
+          <a:p>
+            <a:r>
+              <a:rPr lang="en-US" dirty="0"/>
+              <a:t>Binary is numbers in base 2, decimal is numbers in base 10 (what most of us grew up with)</a:t>
+            </a:r>
+          </a:p>
+          <a:p>
+            <a:pPr lvl="1"/>
+            <a:r>
+              <a:rPr lang="en-US" dirty="0"/>
+              <a:t>0100</a:t>
+            </a:r>
+            <a:r>
+              <a:rPr lang="en-US" baseline="-25000" dirty="0"/>
+              <a:t>2 </a:t>
+            </a:r>
+            <a:r>
+              <a:rPr lang="en-US" dirty="0"/>
+              <a:t>= 0*(2^0) + 0*(2^1) + 1*(2^2) + 0*(2^3) = 0 + 0 + 4 + 0 = 4</a:t>
+            </a:r>
+            <a:r>
+              <a:rPr lang="en-US" baseline="-25000" dirty="0"/>
+              <a:t>10</a:t>
+            </a:r>
+          </a:p>
+          <a:p>
+            <a:pPr lvl="1"/>
+            <a:r>
+              <a:rPr lang="en-US" dirty="0"/>
+              <a:t>19</a:t>
+            </a:r>
+            <a:r>
+              <a:rPr lang="en-US" baseline="-25000" dirty="0"/>
+              <a:t>10 </a:t>
+            </a:r>
+            <a:r>
+              <a:rPr lang="en-US" dirty="0"/>
+              <a:t>= 9*(10^0) + 1*(10^1) = 9(1) + 1(10) = 19</a:t>
+            </a:r>
+          </a:p>
+          <a:p>
+            <a:r>
+              <a:rPr lang="en-US" dirty="0"/>
+              <a:t>Unsigned vs Signed</a:t>
+            </a:r>
+          </a:p>
+          <a:p>
+            <a:pPr lvl="1"/>
+            <a:r>
+              <a:rPr lang="en-US" dirty="0"/>
+              <a:t>Unsigned = there is a bit that identifies if the number is positive or negative.</a:t>
+            </a:r>
+          </a:p>
+          <a:p>
+            <a:pPr lvl="1"/>
+            <a:r>
+              <a:rPr lang="en-US" dirty="0"/>
+              <a:t>Signed = the number is always positive.</a:t>
+            </a:r>
+          </a:p>
+          <a:p>
+            <a:pPr marL="502920" lvl="1" indent="0">
+              <a:buNone/>
+            </a:pPr>
+            <a:endParaRPr lang="en-US" baseline="-25000" dirty="0"/>
+          </a:p>
+        </p:txBody>
+      </p:sp>
+    </p:spTree>
+    <p:extLst>
+      <p:ext uri="{BB962C8B-B14F-4D97-AF65-F5344CB8AC3E}">
+        <p14:creationId xmlns:p14="http://schemas.microsoft.com/office/powerpoint/2010/main" val="3776821364"/>
+      </p:ext>
+    </p:extLst>
+  </p:cSld>
+  <p:clrMapOvr>
+    <a:masterClrMapping/>
+  </p:clrMapOvr>
+</p:sld>
+</file>
+
+<file path=ppt/slides/slide3.xml><?xml version="1.0" encoding="utf-8"?>
+<p:sld xmlns:a="http://schemas.openxmlformats.org/drawingml/2006/main" xmlns:r="http://schemas.openxmlformats.org/officeDocument/2006/relationships" xmlns:p="http://schemas.openxmlformats.org/presentationml/2006/main">
+  <p:cSld>
+    <p:spTree>
+      <p:nvGrpSpPr>
+        <p:cNvPr id="1" name=""/>
+        <p:cNvGrpSpPr/>
+        <p:nvPr/>
+      </p:nvGrpSpPr>
+      <p:grpSpPr>
+        <a:xfrm>
+          <a:off x="0" y="0"/>
+          <a:ext cx="0" cy="0"/>
+          <a:chOff x="0" y="0"/>
+          <a:chExt cx="0" cy="0"/>
+        </a:xfrm>
+      </p:grpSpPr>
+      <p:sp>
+        <p:nvSpPr>
+          <p:cNvPr id="2" name="Title 1">
+            <a:extLst>
+              <a:ext uri="{FF2B5EF4-FFF2-40B4-BE49-F238E27FC236}">
+                <a16:creationId xmlns:a16="http://schemas.microsoft.com/office/drawing/2014/main" id="{1025EB33-0647-4B39-BE45-2DE081CE0B99}"/>
+              </a:ext>
+            </a:extLst>
+          </p:cNvPr>
+          <p:cNvSpPr>
+            <a:spLocks noGrp="1"/>
+          </p:cNvSpPr>
+          <p:nvPr>
+            <p:ph type="title"/>
+          </p:nvPr>
+        </p:nvSpPr>
+        <p:spPr/>
+        <p:txBody>
+          <a:bodyPr/>
+          <a:lstStyle/>
+          <a:p>
+            <a:endParaRPr lang="en-US"/>
+          </a:p>
+        </p:txBody>
+      </p:sp>
+      <p:sp>
+        <p:nvSpPr>
+          <p:cNvPr id="3" name="Content Placeholder 2">
+            <a:extLst>
+              <a:ext uri="{FF2B5EF4-FFF2-40B4-BE49-F238E27FC236}">
+                <a16:creationId xmlns:a16="http://schemas.microsoft.com/office/drawing/2014/main" id="{E3B7ADA3-6DE8-4C8D-BC5A-7D5F6E7EC8C1}"/>
+              </a:ext>
+            </a:extLst>
+          </p:cNvPr>
+          <p:cNvSpPr>
+            <a:spLocks noGrp="1"/>
+          </p:cNvSpPr>
+          <p:nvPr>
+            <p:ph idx="1"/>
+          </p:nvPr>
+        </p:nvSpPr>
+        <p:spPr/>
+        <p:txBody>
+          <a:bodyPr/>
+          <a:lstStyle/>
+          <a:p>
+            <a:r>
+              <a:rPr lang="en-US" dirty="0"/>
+              <a:t>Int32 = </a:t>
+            </a:r>
+          </a:p>
+        </p:txBody>
+      </p:sp>
+      <p:graphicFrame>
+        <p:nvGraphicFramePr>
+          <p:cNvPr id="4" name="Table 3">
+            <a:extLst>
+              <a:ext uri="{FF2B5EF4-FFF2-40B4-BE49-F238E27FC236}">
+                <a16:creationId xmlns:a16="http://schemas.microsoft.com/office/drawing/2014/main" id="{CB34FF89-0080-460F-8B26-A2C2DFAB2DB2}"/>
+              </a:ext>
+            </a:extLst>
+          </p:cNvPr>
+          <p:cNvGraphicFramePr>
+            <a:graphicFrameLocks noGrp="1"/>
+          </p:cNvGraphicFramePr>
+          <p:nvPr>
+            <p:extLst>
+              <p:ext uri="{D42A27DB-BD31-4B8C-83A1-F6EECF244321}">
+                <p14:modId xmlns:p14="http://schemas.microsoft.com/office/powerpoint/2010/main" val="2329009467"/>
+              </p:ext>
+            </p:extLst>
+          </p:nvPr>
+        </p:nvGraphicFramePr>
+        <p:xfrm>
+          <a:off x="3504540" y="3609283"/>
+          <a:ext cx="8104474" cy="640080"/>
+        </p:xfrm>
+        <a:graphic>
+          <a:graphicData uri="http://schemas.openxmlformats.org/drawingml/2006/table">
+            <a:tbl>
+              <a:tblPr firstRow="1" bandRow="1">
+                <a:tableStyleId>{5C22544A-7EE6-4342-B048-85BDC9FD1C3A}</a:tableStyleId>
+              </a:tblPr>
+              <a:tblGrid>
+                <a:gridCol w="230505">
+                  <a:extLst>
+                    <a:ext uri="{9D8B030D-6E8A-4147-A177-3AD203B41FA5}">
+                      <a16:colId xmlns:a16="http://schemas.microsoft.com/office/drawing/2014/main" val="3750503142"/>
+                    </a:ext>
+                  </a:extLst>
+                </a:gridCol>
+                <a:gridCol w="253999">
+                  <a:extLst>
+                    <a:ext uri="{9D8B030D-6E8A-4147-A177-3AD203B41FA5}">
+                      <a16:colId xmlns:a16="http://schemas.microsoft.com/office/drawing/2014/main" val="2021388167"/>
+                    </a:ext>
+                  </a:extLst>
+                </a:gridCol>
+                <a:gridCol w="253999">
+                  <a:extLst>
+                    <a:ext uri="{9D8B030D-6E8A-4147-A177-3AD203B41FA5}">
+                      <a16:colId xmlns:a16="http://schemas.microsoft.com/office/drawing/2014/main" val="781294667"/>
+                    </a:ext>
+                  </a:extLst>
+                </a:gridCol>
+                <a:gridCol w="253999">
+                  <a:extLst>
+                    <a:ext uri="{9D8B030D-6E8A-4147-A177-3AD203B41FA5}">
+                      <a16:colId xmlns:a16="http://schemas.microsoft.com/office/drawing/2014/main" val="3891085250"/>
+                    </a:ext>
+                  </a:extLst>
+                </a:gridCol>
+                <a:gridCol w="253999">
+                  <a:extLst>
+                    <a:ext uri="{9D8B030D-6E8A-4147-A177-3AD203B41FA5}">
+                      <a16:colId xmlns:a16="http://schemas.microsoft.com/office/drawing/2014/main" val="2887663062"/>
+                    </a:ext>
+                  </a:extLst>
+                </a:gridCol>
+                <a:gridCol w="253999">
+                  <a:extLst>
+                    <a:ext uri="{9D8B030D-6E8A-4147-A177-3AD203B41FA5}">
+                      <a16:colId xmlns:a16="http://schemas.microsoft.com/office/drawing/2014/main" val="2962899083"/>
+                    </a:ext>
+                  </a:extLst>
+                </a:gridCol>
+                <a:gridCol w="253999">
+                  <a:extLst>
+                    <a:ext uri="{9D8B030D-6E8A-4147-A177-3AD203B41FA5}">
+                      <a16:colId xmlns:a16="http://schemas.microsoft.com/office/drawing/2014/main" val="1262748729"/>
+                    </a:ext>
+                  </a:extLst>
+                </a:gridCol>
+                <a:gridCol w="253999">
+                  <a:extLst>
+                    <a:ext uri="{9D8B030D-6E8A-4147-A177-3AD203B41FA5}">
+                      <a16:colId xmlns:a16="http://schemas.microsoft.com/office/drawing/2014/main" val="1658304247"/>
+                    </a:ext>
+                  </a:extLst>
+                </a:gridCol>
+                <a:gridCol w="253999">
+                  <a:extLst>
+                    <a:ext uri="{9D8B030D-6E8A-4147-A177-3AD203B41FA5}">
+                      <a16:colId xmlns:a16="http://schemas.microsoft.com/office/drawing/2014/main" val="3231433322"/>
+                    </a:ext>
+                  </a:extLst>
+                </a:gridCol>
+                <a:gridCol w="253999">
+                  <a:extLst>
+                    <a:ext uri="{9D8B030D-6E8A-4147-A177-3AD203B41FA5}">
+                      <a16:colId xmlns:a16="http://schemas.microsoft.com/office/drawing/2014/main" val="3188604016"/>
+                    </a:ext>
+                  </a:extLst>
+                </a:gridCol>
+                <a:gridCol w="253999">
+                  <a:extLst>
+                    <a:ext uri="{9D8B030D-6E8A-4147-A177-3AD203B41FA5}">
+                      <a16:colId xmlns:a16="http://schemas.microsoft.com/office/drawing/2014/main" val="3023928134"/>
+                    </a:ext>
+                  </a:extLst>
+                </a:gridCol>
+                <a:gridCol w="253999">
+                  <a:extLst>
+                    <a:ext uri="{9D8B030D-6E8A-4147-A177-3AD203B41FA5}">
+                      <a16:colId xmlns:a16="http://schemas.microsoft.com/office/drawing/2014/main" val="241261391"/>
+                    </a:ext>
+                  </a:extLst>
+                </a:gridCol>
+                <a:gridCol w="253999">
+                  <a:extLst>
+                    <a:ext uri="{9D8B030D-6E8A-4147-A177-3AD203B41FA5}">
+                      <a16:colId xmlns:a16="http://schemas.microsoft.com/office/drawing/2014/main" val="556910575"/>
+                    </a:ext>
+                  </a:extLst>
+                </a:gridCol>
+                <a:gridCol w="253999">
+                  <a:extLst>
+                    <a:ext uri="{9D8B030D-6E8A-4147-A177-3AD203B41FA5}">
+                      <a16:colId xmlns:a16="http://schemas.microsoft.com/office/drawing/2014/main" val="3725914555"/>
+                    </a:ext>
+                  </a:extLst>
+                </a:gridCol>
+                <a:gridCol w="253999">
+                  <a:extLst>
+                    <a:ext uri="{9D8B030D-6E8A-4147-A177-3AD203B41FA5}">
+                      <a16:colId xmlns:a16="http://schemas.microsoft.com/office/drawing/2014/main" val="382605949"/>
+                    </a:ext>
+                  </a:extLst>
+                </a:gridCol>
+                <a:gridCol w="253999">
+                  <a:extLst>
+                    <a:ext uri="{9D8B030D-6E8A-4147-A177-3AD203B41FA5}">
+                      <a16:colId xmlns:a16="http://schemas.microsoft.com/office/drawing/2014/main" val="3550200242"/>
+                    </a:ext>
+                  </a:extLst>
+                </a:gridCol>
+                <a:gridCol w="253999">
+                  <a:extLst>
+                    <a:ext uri="{9D8B030D-6E8A-4147-A177-3AD203B41FA5}">
+                      <a16:colId xmlns:a16="http://schemas.microsoft.com/office/drawing/2014/main" val="1760169334"/>
+                    </a:ext>
+                  </a:extLst>
+                </a:gridCol>
+                <a:gridCol w="253999">
+                  <a:extLst>
+                    <a:ext uri="{9D8B030D-6E8A-4147-A177-3AD203B41FA5}">
+                      <a16:colId xmlns:a16="http://schemas.microsoft.com/office/drawing/2014/main" val="536151751"/>
+                    </a:ext>
+                  </a:extLst>
+                </a:gridCol>
+                <a:gridCol w="253999">
+                  <a:extLst>
+                    <a:ext uri="{9D8B030D-6E8A-4147-A177-3AD203B41FA5}">
+                      <a16:colId xmlns:a16="http://schemas.microsoft.com/office/drawing/2014/main" val="877971548"/>
+                    </a:ext>
+                  </a:extLst>
+                </a:gridCol>
+                <a:gridCol w="253999">
+                  <a:extLst>
+                    <a:ext uri="{9D8B030D-6E8A-4147-A177-3AD203B41FA5}">
+                      <a16:colId xmlns:a16="http://schemas.microsoft.com/office/drawing/2014/main" val="4241548925"/>
+                    </a:ext>
+                  </a:extLst>
+                </a:gridCol>
+                <a:gridCol w="253999">
+                  <a:extLst>
+                    <a:ext uri="{9D8B030D-6E8A-4147-A177-3AD203B41FA5}">
+                      <a16:colId xmlns:a16="http://schemas.microsoft.com/office/drawing/2014/main" val="2453757301"/>
+                    </a:ext>
+                  </a:extLst>
+                </a:gridCol>
+                <a:gridCol w="253999">
+                  <a:extLst>
+                    <a:ext uri="{9D8B030D-6E8A-4147-A177-3AD203B41FA5}">
+                      <a16:colId xmlns:a16="http://schemas.microsoft.com/office/drawing/2014/main" val="2737945378"/>
+                    </a:ext>
+                  </a:extLst>
+                </a:gridCol>
+                <a:gridCol w="253999">
+                  <a:extLst>
+                    <a:ext uri="{9D8B030D-6E8A-4147-A177-3AD203B41FA5}">
+                      <a16:colId xmlns:a16="http://schemas.microsoft.com/office/drawing/2014/main" val="3986287565"/>
+                    </a:ext>
+                  </a:extLst>
+                </a:gridCol>
+                <a:gridCol w="253999">
+                  <a:extLst>
+                    <a:ext uri="{9D8B030D-6E8A-4147-A177-3AD203B41FA5}">
+                      <a16:colId xmlns:a16="http://schemas.microsoft.com/office/drawing/2014/main" val="1155919503"/>
+                    </a:ext>
+                  </a:extLst>
+                </a:gridCol>
+                <a:gridCol w="253999">
+                  <a:extLst>
+                    <a:ext uri="{9D8B030D-6E8A-4147-A177-3AD203B41FA5}">
+                      <a16:colId xmlns:a16="http://schemas.microsoft.com/office/drawing/2014/main" val="1885941315"/>
+                    </a:ext>
+                  </a:extLst>
+                </a:gridCol>
+                <a:gridCol w="253999">
+                  <a:extLst>
+                    <a:ext uri="{9D8B030D-6E8A-4147-A177-3AD203B41FA5}">
+                      <a16:colId xmlns:a16="http://schemas.microsoft.com/office/drawing/2014/main" val="849260904"/>
+                    </a:ext>
+                  </a:extLst>
+                </a:gridCol>
+                <a:gridCol w="253999">
+                  <a:extLst>
+                    <a:ext uri="{9D8B030D-6E8A-4147-A177-3AD203B41FA5}">
+                      <a16:colId xmlns:a16="http://schemas.microsoft.com/office/drawing/2014/main" val="3441887803"/>
+                    </a:ext>
+                  </a:extLst>
+                </a:gridCol>
+                <a:gridCol w="253999">
+                  <a:extLst>
+                    <a:ext uri="{9D8B030D-6E8A-4147-A177-3AD203B41FA5}">
+                      <a16:colId xmlns:a16="http://schemas.microsoft.com/office/drawing/2014/main" val="428413941"/>
+                    </a:ext>
+                  </a:extLst>
+                </a:gridCol>
+                <a:gridCol w="253999">
+                  <a:extLst>
+                    <a:ext uri="{9D8B030D-6E8A-4147-A177-3AD203B41FA5}">
+                      <a16:colId xmlns:a16="http://schemas.microsoft.com/office/drawing/2014/main" val="1640873409"/>
+                    </a:ext>
+                  </a:extLst>
+                </a:gridCol>
+                <a:gridCol w="253999">
+                  <a:extLst>
+                    <a:ext uri="{9D8B030D-6E8A-4147-A177-3AD203B41FA5}">
+                      <a16:colId xmlns:a16="http://schemas.microsoft.com/office/drawing/2014/main" val="916535158"/>
+                    </a:ext>
+                  </a:extLst>
+                </a:gridCol>
+                <a:gridCol w="253999">
+                  <a:extLst>
+                    <a:ext uri="{9D8B030D-6E8A-4147-A177-3AD203B41FA5}">
+                      <a16:colId xmlns:a16="http://schemas.microsoft.com/office/drawing/2014/main" val="141755971"/>
+                    </a:ext>
+                  </a:extLst>
+                </a:gridCol>
+                <a:gridCol w="253999">
+                  <a:extLst>
+                    <a:ext uri="{9D8B030D-6E8A-4147-A177-3AD203B41FA5}">
+                      <a16:colId xmlns:a16="http://schemas.microsoft.com/office/drawing/2014/main" val="2664908669"/>
+                    </a:ext>
+                  </a:extLst>
+                </a:gridCol>
+              </a:tblGrid>
+              <a:tr h="370840">
+                <a:tc>
+                  <a:txBody>
+                    <a:bodyPr/>
+                    <a:lstStyle/>
+                    <a:p>
+                      <a:r>
+                        <a:rPr lang="en-US"/>
+                        <a:t>0</a:t>
+                      </a:r>
+                      <a:endParaRPr lang="en-US" dirty="0"/>
+                    </a:p>
+                  </a:txBody>
+                  <a:tcPr/>
+                </a:tc>
+                <a:tc>
+                  <a:txBody>
+                    <a:bodyPr/>
+                    <a:lstStyle/>
+                    <a:p>
+                      <a:r>
+                        <a:rPr lang="en-US" dirty="0"/>
+                        <a:t>0</a:t>
+                      </a:r>
+                    </a:p>
+                  </a:txBody>
+                  <a:tcPr/>
+                </a:tc>
+                <a:tc>
+                  <a:txBody>
+                    <a:bodyPr/>
+                    <a:lstStyle/>
+                    <a:p>
+                      <a:r>
+                        <a:rPr lang="en-US" dirty="0"/>
+                        <a:t>0</a:t>
+                      </a:r>
+                    </a:p>
+                  </a:txBody>
+                  <a:tcPr/>
+                </a:tc>
+                <a:tc>
+                  <a:txBody>
+                    <a:bodyPr/>
+                    <a:lstStyle/>
+                    <a:p>
+                      <a:r>
+                        <a:rPr lang="en-US" dirty="0"/>
+                        <a:t>0</a:t>
+                      </a:r>
+                    </a:p>
+                  </a:txBody>
+                  <a:tcPr/>
+                </a:tc>
+                <a:tc>
+                  <a:txBody>
+                    <a:bodyPr/>
+                    <a:lstStyle/>
+                    <a:p>
+                      <a:r>
+                        <a:rPr lang="en-US" dirty="0"/>
+                        <a:t>0</a:t>
+                      </a:r>
+                    </a:p>
+                  </a:txBody>
+                  <a:tcPr/>
+                </a:tc>
+                <a:tc>
+                  <a:txBody>
+                    <a:bodyPr/>
+                    <a:lstStyle/>
+                    <a:p>
+                      <a:r>
+                        <a:rPr lang="en-US" dirty="0"/>
+                        <a:t>0</a:t>
+                      </a:r>
+                    </a:p>
+                  </a:txBody>
+                  <a:tcPr/>
+                </a:tc>
+                <a:tc>
+                  <a:txBody>
+                    <a:bodyPr/>
+                    <a:lstStyle/>
+                    <a:p>
+                      <a:r>
+                        <a:rPr lang="en-US" dirty="0"/>
+                        <a:t>0</a:t>
+                      </a:r>
+                    </a:p>
+                  </a:txBody>
+                  <a:tcPr/>
+                </a:tc>
+                <a:tc>
+                  <a:txBody>
+                    <a:bodyPr/>
+                    <a:lstStyle/>
+                    <a:p>
+                      <a:r>
+                        <a:rPr lang="en-US" dirty="0"/>
+                        <a:t>0</a:t>
+                      </a:r>
+                    </a:p>
+                  </a:txBody>
+                  <a:tcPr/>
+                </a:tc>
+                <a:tc>
+                  <a:txBody>
+                    <a:bodyPr/>
+                    <a:lstStyle/>
+                    <a:p>
+                      <a:r>
+                        <a:rPr lang="en-US" dirty="0"/>
+                        <a:t>0</a:t>
+                      </a:r>
+                    </a:p>
+                  </a:txBody>
+                  <a:tcPr/>
+                </a:tc>
+                <a:tc>
+                  <a:txBody>
+                    <a:bodyPr/>
+                    <a:lstStyle/>
+                    <a:p>
+                      <a:r>
+                        <a:rPr lang="en-US" dirty="0"/>
+                        <a:t>0</a:t>
+                      </a:r>
+                    </a:p>
+                  </a:txBody>
+                  <a:tcPr/>
+                </a:tc>
+                <a:tc>
+                  <a:txBody>
+                    <a:bodyPr/>
+                    <a:lstStyle/>
+                    <a:p>
+                      <a:r>
+                        <a:rPr lang="en-US" dirty="0"/>
+                        <a:t>00</a:t>
+                      </a:r>
+                    </a:p>
+                  </a:txBody>
+                  <a:tcPr/>
+                </a:tc>
+                <a:tc>
+                  <a:txBody>
+                    <a:bodyPr/>
+                    <a:lstStyle/>
+                    <a:p>
+                      <a:r>
+                        <a:rPr lang="en-US" dirty="0"/>
+                        <a:t>0</a:t>
+                      </a:r>
+                    </a:p>
+                  </a:txBody>
+                  <a:tcPr/>
+                </a:tc>
+                <a:tc>
+                  <a:txBody>
+                    <a:bodyPr/>
+                    <a:lstStyle/>
+                    <a:p>
+                      <a:r>
+                        <a:rPr lang="en-US" dirty="0"/>
+                        <a:t>0</a:t>
+                      </a:r>
+                    </a:p>
+                  </a:txBody>
+                  <a:tcPr/>
+                </a:tc>
+                <a:tc>
+                  <a:txBody>
+                    <a:bodyPr/>
+                    <a:lstStyle/>
+                    <a:p>
+                      <a:r>
+                        <a:rPr lang="en-US" dirty="0"/>
+                        <a:t>0</a:t>
+                      </a:r>
+                    </a:p>
+                  </a:txBody>
+                  <a:tcPr/>
+                </a:tc>
+                <a:tc>
+                  <a:txBody>
+                    <a:bodyPr/>
+                    <a:lstStyle/>
+                    <a:p>
+                      <a:r>
+                        <a:rPr lang="en-US" dirty="0"/>
+                        <a:t>0</a:t>
+                      </a:r>
+                    </a:p>
+                  </a:txBody>
+                  <a:tcPr/>
+                </a:tc>
+                <a:tc>
+                  <a:txBody>
+                    <a:bodyPr/>
+                    <a:lstStyle/>
+                    <a:p>
+                      <a:r>
+                        <a:rPr lang="en-US" dirty="0"/>
+                        <a:t>0</a:t>
+                      </a:r>
+                    </a:p>
+                  </a:txBody>
+                  <a:tcPr/>
+                </a:tc>
+                <a:tc>
+                  <a:txBody>
+                    <a:bodyPr/>
+                    <a:lstStyle/>
+                    <a:p>
+                      <a:r>
+                        <a:rPr lang="en-US" dirty="0"/>
+                        <a:t>0</a:t>
+                      </a:r>
+                    </a:p>
+                  </a:txBody>
+                  <a:tcPr/>
+                </a:tc>
+                <a:tc>
+                  <a:txBody>
+                    <a:bodyPr/>
+                    <a:lstStyle/>
+                    <a:p>
+                      <a:r>
+                        <a:rPr lang="en-US" dirty="0"/>
+                        <a:t>0</a:t>
+                      </a:r>
+                    </a:p>
+                  </a:txBody>
+                  <a:tcPr/>
+                </a:tc>
+                <a:tc>
+                  <a:txBody>
+                    <a:bodyPr/>
+                    <a:lstStyle/>
+                    <a:p>
+                      <a:r>
+                        <a:rPr lang="en-US" dirty="0"/>
+                        <a:t>0</a:t>
+                      </a:r>
+                    </a:p>
+                  </a:txBody>
+                  <a:tcPr/>
+                </a:tc>
+                <a:tc>
+                  <a:txBody>
+                    <a:bodyPr/>
+                    <a:lstStyle/>
+                    <a:p>
+                      <a:r>
+                        <a:rPr lang="en-US" dirty="0"/>
+                        <a:t>00</a:t>
+                      </a:r>
+                    </a:p>
+                  </a:txBody>
+                  <a:tcPr/>
+                </a:tc>
+                <a:tc>
+                  <a:txBody>
+                    <a:bodyPr/>
+                    <a:lstStyle/>
+                    <a:p>
+                      <a:r>
+                        <a:rPr lang="en-US" dirty="0"/>
+                        <a:t>0</a:t>
+                      </a:r>
+                    </a:p>
+                  </a:txBody>
+                  <a:tcPr/>
+                </a:tc>
+                <a:tc>
+                  <a:txBody>
+                    <a:bodyPr/>
+                    <a:lstStyle/>
+                    <a:p>
+                      <a:r>
+                        <a:rPr lang="en-US" dirty="0"/>
+                        <a:t>0</a:t>
+                      </a:r>
+                    </a:p>
+                  </a:txBody>
+                  <a:tcPr/>
+                </a:tc>
+                <a:tc>
+                  <a:txBody>
+                    <a:bodyPr/>
+                    <a:lstStyle/>
+                    <a:p>
+                      <a:r>
+                        <a:rPr lang="en-US" dirty="0"/>
+                        <a:t>00</a:t>
+                      </a:r>
+                    </a:p>
+                  </a:txBody>
+                  <a:tcPr/>
+                </a:tc>
+                <a:tc>
+                  <a:txBody>
+                    <a:bodyPr/>
+                    <a:lstStyle/>
+                    <a:p>
+                      <a:r>
+                        <a:rPr lang="en-US" dirty="0"/>
+                        <a:t>0</a:t>
+                      </a:r>
+                    </a:p>
+                  </a:txBody>
+                  <a:tcPr/>
+                </a:tc>
+                <a:tc>
+                  <a:txBody>
+                    <a:bodyPr/>
+                    <a:lstStyle/>
+                    <a:p>
+                      <a:r>
+                        <a:rPr lang="en-US" dirty="0"/>
+                        <a:t>0</a:t>
+                      </a:r>
+                    </a:p>
+                  </a:txBody>
+                  <a:tcPr/>
+                </a:tc>
+                <a:tc>
+                  <a:txBody>
+                    <a:bodyPr/>
+                    <a:lstStyle/>
+                    <a:p>
+                      <a:r>
+                        <a:rPr lang="en-US" dirty="0"/>
+                        <a:t>0</a:t>
+                      </a:r>
+                    </a:p>
+                  </a:txBody>
+                  <a:tcPr/>
+                </a:tc>
+                <a:tc>
+                  <a:txBody>
+                    <a:bodyPr/>
+                    <a:lstStyle/>
+                    <a:p>
+                      <a:r>
+                        <a:rPr lang="en-US" dirty="0"/>
+                        <a:t>0</a:t>
+                      </a:r>
+                    </a:p>
+                  </a:txBody>
+                  <a:tcPr/>
+                </a:tc>
+                <a:tc>
+                  <a:txBody>
+                    <a:bodyPr/>
+                    <a:lstStyle/>
+                    <a:p>
+                      <a:r>
+                        <a:rPr lang="en-US" dirty="0"/>
+                        <a:t>0</a:t>
+                      </a:r>
+                    </a:p>
+                  </a:txBody>
+                  <a:tcPr/>
+                </a:tc>
+                <a:tc>
+                  <a:txBody>
+                    <a:bodyPr/>
+                    <a:lstStyle/>
+                    <a:p>
+                      <a:r>
+                        <a:rPr lang="en-US" dirty="0"/>
+                        <a:t>0</a:t>
+                      </a:r>
+                    </a:p>
+                  </a:txBody>
+                  <a:tcPr/>
+                </a:tc>
+                <a:tc>
+                  <a:txBody>
+                    <a:bodyPr/>
+                    <a:lstStyle/>
+                    <a:p>
+                      <a:r>
+                        <a:rPr lang="en-US" dirty="0"/>
+                        <a:t>0</a:t>
+                      </a:r>
+                    </a:p>
+                  </a:txBody>
+                  <a:tcPr/>
+                </a:tc>
+                <a:tc>
+                  <a:txBody>
+                    <a:bodyPr/>
+                    <a:lstStyle/>
+                    <a:p>
+                      <a:r>
+                        <a:rPr lang="en-US" dirty="0"/>
+                        <a:t>0</a:t>
+                      </a:r>
+                    </a:p>
+                  </a:txBody>
+                  <a:tcPr/>
+                </a:tc>
+                <a:tc>
+                  <a:txBody>
+                    <a:bodyPr/>
+                    <a:lstStyle/>
+                    <a:p>
+                      <a:r>
+                        <a:rPr lang="en-US" dirty="0"/>
+                        <a:t>1</a:t>
+                      </a:r>
+                    </a:p>
+                  </a:txBody>
+                  <a:tcPr/>
+                </a:tc>
+                <a:extLst>
+                  <a:ext uri="{0D108BD9-81ED-4DB2-BD59-A6C34878D82A}">
+                    <a16:rowId xmlns:a16="http://schemas.microsoft.com/office/drawing/2014/main" val="247343545"/>
+                  </a:ext>
+                </a:extLst>
+              </a:tr>
+            </a:tbl>
+          </a:graphicData>
+        </a:graphic>
+      </p:graphicFrame>
+      <p:graphicFrame>
+        <p:nvGraphicFramePr>
+          <p:cNvPr id="5" name="Table 4">
+            <a:extLst>
+              <a:ext uri="{FF2B5EF4-FFF2-40B4-BE49-F238E27FC236}">
+                <a16:creationId xmlns:a16="http://schemas.microsoft.com/office/drawing/2014/main" id="{FB7E08E0-230A-4312-8A14-4A11EEC34B22}"/>
+              </a:ext>
+            </a:extLst>
+          </p:cNvPr>
+          <p:cNvGraphicFramePr>
+            <a:graphicFrameLocks noGrp="1"/>
+          </p:cNvGraphicFramePr>
+          <p:nvPr>
+            <p:extLst>
+              <p:ext uri="{D42A27DB-BD31-4B8C-83A1-F6EECF244321}">
+                <p14:modId xmlns:p14="http://schemas.microsoft.com/office/powerpoint/2010/main" val="2066152478"/>
+              </p:ext>
+            </p:extLst>
+          </p:nvPr>
+        </p:nvGraphicFramePr>
+        <p:xfrm>
+          <a:off x="3504540" y="3980123"/>
+          <a:ext cx="8171202" cy="370840"/>
+        </p:xfrm>
+        <a:graphic>
+          <a:graphicData uri="http://schemas.openxmlformats.org/drawingml/2006/table">
+            <a:tbl>
+              <a:tblPr firstRow="1" bandRow="1">
+                <a:tableStyleId>{5C22544A-7EE6-4342-B048-85BDC9FD1C3A}</a:tableStyleId>
+              </a:tblPr>
+              <a:tblGrid>
+                <a:gridCol w="208280">
+                  <a:extLst>
+                    <a:ext uri="{9D8B030D-6E8A-4147-A177-3AD203B41FA5}">
+                      <a16:colId xmlns:a16="http://schemas.microsoft.com/office/drawing/2014/main" val="3750503142"/>
+                    </a:ext>
+                  </a:extLst>
+                </a:gridCol>
+                <a:gridCol w="208280">
+                  <a:extLst>
+                    <a:ext uri="{9D8B030D-6E8A-4147-A177-3AD203B41FA5}">
+                      <a16:colId xmlns:a16="http://schemas.microsoft.com/office/drawing/2014/main" val="2021388167"/>
+                    </a:ext>
+                  </a:extLst>
+                </a:gridCol>
+                <a:gridCol w="208280">
+                  <a:extLst>
+                    <a:ext uri="{9D8B030D-6E8A-4147-A177-3AD203B41FA5}">
+                      <a16:colId xmlns:a16="http://schemas.microsoft.com/office/drawing/2014/main" val="781294667"/>
+                    </a:ext>
+                  </a:extLst>
+                </a:gridCol>
+                <a:gridCol w="208280">
+                  <a:extLst>
+                    <a:ext uri="{9D8B030D-6E8A-4147-A177-3AD203B41FA5}">
+                      <a16:colId xmlns:a16="http://schemas.microsoft.com/office/drawing/2014/main" val="3891085250"/>
+                    </a:ext>
+                  </a:extLst>
+                </a:gridCol>
+                <a:gridCol w="208280">
+                  <a:extLst>
+                    <a:ext uri="{9D8B030D-6E8A-4147-A177-3AD203B41FA5}">
+                      <a16:colId xmlns:a16="http://schemas.microsoft.com/office/drawing/2014/main" val="2887663062"/>
+                    </a:ext>
+                  </a:extLst>
+                </a:gridCol>
+                <a:gridCol w="208280">
+                  <a:extLst>
+                    <a:ext uri="{9D8B030D-6E8A-4147-A177-3AD203B41FA5}">
+                      <a16:colId xmlns:a16="http://schemas.microsoft.com/office/drawing/2014/main" val="2962899083"/>
+                    </a:ext>
+                  </a:extLst>
+                </a:gridCol>
+                <a:gridCol w="208280">
+                  <a:extLst>
+                    <a:ext uri="{9D8B030D-6E8A-4147-A177-3AD203B41FA5}">
+                      <a16:colId xmlns:a16="http://schemas.microsoft.com/office/drawing/2014/main" val="1262748729"/>
+                    </a:ext>
+                  </a:extLst>
+                </a:gridCol>
+                <a:gridCol w="208280">
+                  <a:extLst>
+                    <a:ext uri="{9D8B030D-6E8A-4147-A177-3AD203B41FA5}">
+                      <a16:colId xmlns:a16="http://schemas.microsoft.com/office/drawing/2014/main" val="1658304247"/>
+                    </a:ext>
+                  </a:extLst>
+                </a:gridCol>
+                <a:gridCol w="208280">
+                  <a:extLst>
+                    <a:ext uri="{9D8B030D-6E8A-4147-A177-3AD203B41FA5}">
+                      <a16:colId xmlns:a16="http://schemas.microsoft.com/office/drawing/2014/main" val="3231433322"/>
+                    </a:ext>
+                  </a:extLst>
+                </a:gridCol>
+                <a:gridCol w="208280">
+                  <a:extLst>
+                    <a:ext uri="{9D8B030D-6E8A-4147-A177-3AD203B41FA5}">
+                      <a16:colId xmlns:a16="http://schemas.microsoft.com/office/drawing/2014/main" val="3188604016"/>
+                    </a:ext>
+                  </a:extLst>
+                </a:gridCol>
+                <a:gridCol w="277237">
+                  <a:extLst>
+                    <a:ext uri="{9D8B030D-6E8A-4147-A177-3AD203B41FA5}">
+                      <a16:colId xmlns:a16="http://schemas.microsoft.com/office/drawing/2014/main" val="3023928134"/>
+                    </a:ext>
+                  </a:extLst>
+                </a:gridCol>
+                <a:gridCol w="274370">
+                  <a:extLst>
+                    <a:ext uri="{9D8B030D-6E8A-4147-A177-3AD203B41FA5}">
+                      <a16:colId xmlns:a16="http://schemas.microsoft.com/office/drawing/2014/main" val="241261391"/>
+                    </a:ext>
+                  </a:extLst>
+                </a:gridCol>
+                <a:gridCol w="275326">
+                  <a:extLst>
+                    <a:ext uri="{9D8B030D-6E8A-4147-A177-3AD203B41FA5}">
+                      <a16:colId xmlns:a16="http://schemas.microsoft.com/office/drawing/2014/main" val="556910575"/>
+                    </a:ext>
+                  </a:extLst>
+                </a:gridCol>
+                <a:gridCol w="270053">
+                  <a:extLst>
+                    <a:ext uri="{9D8B030D-6E8A-4147-A177-3AD203B41FA5}">
+                      <a16:colId xmlns:a16="http://schemas.microsoft.com/office/drawing/2014/main" val="3725914555"/>
+                    </a:ext>
+                  </a:extLst>
+                </a:gridCol>
+                <a:gridCol w="279147">
+                  <a:extLst>
+                    <a:ext uri="{9D8B030D-6E8A-4147-A177-3AD203B41FA5}">
+                      <a16:colId xmlns:a16="http://schemas.microsoft.com/office/drawing/2014/main" val="382605949"/>
+                    </a:ext>
+                  </a:extLst>
+                </a:gridCol>
+                <a:gridCol w="273415">
+                  <a:extLst>
+                    <a:ext uri="{9D8B030D-6E8A-4147-A177-3AD203B41FA5}">
+                      <a16:colId xmlns:a16="http://schemas.microsoft.com/office/drawing/2014/main" val="3550200242"/>
+                    </a:ext>
+                  </a:extLst>
+                </a:gridCol>
+                <a:gridCol w="282013">
+                  <a:extLst>
+                    <a:ext uri="{9D8B030D-6E8A-4147-A177-3AD203B41FA5}">
+                      <a16:colId xmlns:a16="http://schemas.microsoft.com/office/drawing/2014/main" val="1760169334"/>
+                    </a:ext>
+                  </a:extLst>
+                </a:gridCol>
+                <a:gridCol w="270740">
+                  <a:extLst>
+                    <a:ext uri="{9D8B030D-6E8A-4147-A177-3AD203B41FA5}">
+                      <a16:colId xmlns:a16="http://schemas.microsoft.com/office/drawing/2014/main" val="536151751"/>
+                    </a:ext>
+                  </a:extLst>
+                </a:gridCol>
+                <a:gridCol w="282969">
+                  <a:extLst>
+                    <a:ext uri="{9D8B030D-6E8A-4147-A177-3AD203B41FA5}">
+                      <a16:colId xmlns:a16="http://schemas.microsoft.com/office/drawing/2014/main" val="877971548"/>
+                    </a:ext>
+                  </a:extLst>
+                </a:gridCol>
+                <a:gridCol w="282013">
+                  <a:extLst>
+                    <a:ext uri="{9D8B030D-6E8A-4147-A177-3AD203B41FA5}">
+                      <a16:colId xmlns:a16="http://schemas.microsoft.com/office/drawing/2014/main" val="4241548925"/>
+                    </a:ext>
+                  </a:extLst>
+                </a:gridCol>
+                <a:gridCol w="275516">
+                  <a:extLst>
+                    <a:ext uri="{9D8B030D-6E8A-4147-A177-3AD203B41FA5}">
+                      <a16:colId xmlns:a16="http://schemas.microsoft.com/office/drawing/2014/main" val="2453757301"/>
+                    </a:ext>
+                  </a:extLst>
+                </a:gridCol>
+                <a:gridCol w="275326">
+                  <a:extLst>
+                    <a:ext uri="{9D8B030D-6E8A-4147-A177-3AD203B41FA5}">
+                      <a16:colId xmlns:a16="http://schemas.microsoft.com/office/drawing/2014/main" val="2737945378"/>
+                    </a:ext>
+                  </a:extLst>
+                </a:gridCol>
+                <a:gridCol w="273605">
+                  <a:extLst>
+                    <a:ext uri="{9D8B030D-6E8A-4147-A177-3AD203B41FA5}">
+                      <a16:colId xmlns:a16="http://schemas.microsoft.com/office/drawing/2014/main" val="3986287565"/>
+                    </a:ext>
+                  </a:extLst>
+                </a:gridCol>
+                <a:gridCol w="270358">
+                  <a:extLst>
+                    <a:ext uri="{9D8B030D-6E8A-4147-A177-3AD203B41FA5}">
+                      <a16:colId xmlns:a16="http://schemas.microsoft.com/office/drawing/2014/main" val="1155919503"/>
+                    </a:ext>
+                  </a:extLst>
+                </a:gridCol>
+                <a:gridCol w="280103">
+                  <a:extLst>
+                    <a:ext uri="{9D8B030D-6E8A-4147-A177-3AD203B41FA5}">
+                      <a16:colId xmlns:a16="http://schemas.microsoft.com/office/drawing/2014/main" val="1885941315"/>
+                    </a:ext>
+                  </a:extLst>
+                </a:gridCol>
+                <a:gridCol w="270358">
+                  <a:extLst>
+                    <a:ext uri="{9D8B030D-6E8A-4147-A177-3AD203B41FA5}">
+                      <a16:colId xmlns:a16="http://schemas.microsoft.com/office/drawing/2014/main" val="849260904"/>
+                    </a:ext>
+                  </a:extLst>
+                </a:gridCol>
+                <a:gridCol w="282969">
+                  <a:extLst>
+                    <a:ext uri="{9D8B030D-6E8A-4147-A177-3AD203B41FA5}">
+                      <a16:colId xmlns:a16="http://schemas.microsoft.com/office/drawing/2014/main" val="3441887803"/>
+                    </a:ext>
+                  </a:extLst>
+                </a:gridCol>
+                <a:gridCol w="271695">
+                  <a:extLst>
+                    <a:ext uri="{9D8B030D-6E8A-4147-A177-3AD203B41FA5}">
+                      <a16:colId xmlns:a16="http://schemas.microsoft.com/office/drawing/2014/main" val="428413941"/>
+                    </a:ext>
+                  </a:extLst>
+                </a:gridCol>
+                <a:gridCol w="283924">
+                  <a:extLst>
+                    <a:ext uri="{9D8B030D-6E8A-4147-A177-3AD203B41FA5}">
+                      <a16:colId xmlns:a16="http://schemas.microsoft.com/office/drawing/2014/main" val="1640873409"/>
+                    </a:ext>
+                  </a:extLst>
+                </a:gridCol>
+                <a:gridCol w="282969">
+                  <a:extLst>
+                    <a:ext uri="{9D8B030D-6E8A-4147-A177-3AD203B41FA5}">
+                      <a16:colId xmlns:a16="http://schemas.microsoft.com/office/drawing/2014/main" val="916535158"/>
+                    </a:ext>
+                  </a:extLst>
+                </a:gridCol>
+                <a:gridCol w="276281">
+                  <a:extLst>
+                    <a:ext uri="{9D8B030D-6E8A-4147-A177-3AD203B41FA5}">
+                      <a16:colId xmlns:a16="http://schemas.microsoft.com/office/drawing/2014/main" val="141755971"/>
+                    </a:ext>
+                  </a:extLst>
+                </a:gridCol>
+                <a:gridCol w="278015">
+                  <a:extLst>
+                    <a:ext uri="{9D8B030D-6E8A-4147-A177-3AD203B41FA5}">
+                      <a16:colId xmlns:a16="http://schemas.microsoft.com/office/drawing/2014/main" val="2664908669"/>
+                    </a:ext>
+                  </a:extLst>
+                </a:gridCol>
+              </a:tblGrid>
+              <a:tr h="370840">
+                <a:tc>
+                  <a:txBody>
+                    <a:bodyPr/>
+                    <a:lstStyle/>
+                    <a:p>
+                      <a:r>
+                        <a:rPr lang="en-US" sz="500" dirty="0">
+                          <a:solidFill>
+                            <a:schemeClr val="tx1"/>
+                          </a:solidFill>
+                        </a:rPr>
+                        <a:t>0</a:t>
+                      </a:r>
+                    </a:p>
+                  </a:txBody>
+                  <a:tcPr>
+                    <a:solidFill>
+                      <a:schemeClr val="bg1"/>
+                    </a:solidFill>
+                  </a:tcPr>
+                </a:tc>
+                <a:tc>
+                  <a:txBody>
+                    <a:bodyPr/>
+                    <a:lstStyle/>
+                    <a:p>
+                      <a:r>
+                        <a:rPr lang="en-US" sz="500" dirty="0">
+                          <a:solidFill>
+                            <a:schemeClr val="tx1"/>
+                          </a:solidFill>
+                        </a:rPr>
+                        <a:t>1</a:t>
+                      </a:r>
+                    </a:p>
+                  </a:txBody>
+                  <a:tcPr>
+                    <a:solidFill>
+                      <a:schemeClr val="bg1"/>
+                    </a:solidFill>
+                  </a:tcPr>
+                </a:tc>
+                <a:tc>
+                  <a:txBody>
+                    <a:bodyPr/>
+                    <a:lstStyle/>
+                    <a:p>
+                      <a:r>
+                        <a:rPr lang="en-US" sz="500" dirty="0">
+                          <a:solidFill>
+                            <a:schemeClr val="tx1"/>
+                          </a:solidFill>
+                        </a:rPr>
+                        <a:t>2</a:t>
+                      </a:r>
+                    </a:p>
+                  </a:txBody>
+                  <a:tcPr>
+                    <a:solidFill>
+                      <a:schemeClr val="bg1"/>
+                    </a:solidFill>
+                  </a:tcPr>
+                </a:tc>
+                <a:tc>
+                  <a:txBody>
+                    <a:bodyPr/>
+                    <a:lstStyle/>
+                    <a:p>
+                      <a:r>
+                        <a:rPr lang="en-US" sz="500" dirty="0">
+                          <a:solidFill>
+                            <a:schemeClr val="tx1"/>
+                          </a:solidFill>
+                        </a:rPr>
+                        <a:t>3</a:t>
+                      </a:r>
+                    </a:p>
+                  </a:txBody>
+                  <a:tcPr>
+                    <a:solidFill>
+                      <a:schemeClr val="bg1"/>
+                    </a:solidFill>
+                  </a:tcPr>
+                </a:tc>
+                <a:tc>
+                  <a:txBody>
+                    <a:bodyPr/>
+                    <a:lstStyle/>
+                    <a:p>
+                      <a:r>
+                        <a:rPr lang="en-US" sz="500" dirty="0">
+                          <a:solidFill>
+                            <a:schemeClr val="tx1"/>
+                          </a:solidFill>
+                        </a:rPr>
+                        <a:t>4</a:t>
+                      </a:r>
+                    </a:p>
+                  </a:txBody>
+                  <a:tcPr>
+                    <a:solidFill>
+                      <a:schemeClr val="bg1"/>
+                    </a:solidFill>
+                  </a:tcPr>
+                </a:tc>
+                <a:tc>
+                  <a:txBody>
+                    <a:bodyPr/>
+                    <a:lstStyle/>
+                    <a:p>
+                      <a:r>
+                        <a:rPr lang="en-US" sz="500" dirty="0">
+                          <a:solidFill>
+                            <a:schemeClr val="tx1"/>
+                          </a:solidFill>
+                        </a:rPr>
+                        <a:t>5</a:t>
+                      </a:r>
+                    </a:p>
+                  </a:txBody>
+                  <a:tcPr>
+                    <a:solidFill>
+                      <a:schemeClr val="bg1"/>
+                    </a:solidFill>
+                  </a:tcPr>
+                </a:tc>
+                <a:tc>
+                  <a:txBody>
+                    <a:bodyPr/>
+                    <a:lstStyle/>
+                    <a:p>
+                      <a:r>
+                        <a:rPr lang="en-US" sz="500" dirty="0">
+                          <a:solidFill>
+                            <a:schemeClr val="tx1"/>
+                          </a:solidFill>
+                        </a:rPr>
+                        <a:t>6</a:t>
+                      </a:r>
+                    </a:p>
+                  </a:txBody>
+                  <a:tcPr>
+                    <a:solidFill>
+                      <a:schemeClr val="bg1"/>
+                    </a:solidFill>
+                  </a:tcPr>
+                </a:tc>
+                <a:tc>
+                  <a:txBody>
+                    <a:bodyPr/>
+                    <a:lstStyle/>
+                    <a:p>
+                      <a:r>
+                        <a:rPr lang="en-US" sz="500" dirty="0">
+                          <a:solidFill>
+                            <a:schemeClr val="tx1"/>
+                          </a:solidFill>
+                        </a:rPr>
+                        <a:t>7</a:t>
+                      </a:r>
+                    </a:p>
+                  </a:txBody>
+                  <a:tcPr>
+                    <a:solidFill>
+                      <a:schemeClr val="bg1"/>
+                    </a:solidFill>
+                  </a:tcPr>
+                </a:tc>
+                <a:tc>
+                  <a:txBody>
+                    <a:bodyPr/>
+                    <a:lstStyle/>
+                    <a:p>
+                      <a:r>
+                        <a:rPr lang="en-US" sz="500" dirty="0">
+                          <a:solidFill>
+                            <a:schemeClr val="tx1"/>
+                          </a:solidFill>
+                        </a:rPr>
+                        <a:t>8</a:t>
+                      </a:r>
+                    </a:p>
+                  </a:txBody>
+                  <a:tcPr>
+                    <a:solidFill>
+                      <a:schemeClr val="bg1"/>
+                    </a:solidFill>
+                  </a:tcPr>
+                </a:tc>
+                <a:tc>
+                  <a:txBody>
+                    <a:bodyPr/>
+                    <a:lstStyle/>
+                    <a:p>
+                      <a:r>
+                        <a:rPr lang="en-US" sz="500" dirty="0">
+                          <a:solidFill>
+                            <a:schemeClr val="tx1"/>
+                          </a:solidFill>
+                        </a:rPr>
+                        <a:t>9</a:t>
+                      </a:r>
+                    </a:p>
+                  </a:txBody>
+                  <a:tcPr>
+                    <a:solidFill>
+                      <a:schemeClr val="bg1"/>
+                    </a:solidFill>
+                  </a:tcPr>
+                </a:tc>
+                <a:tc>
+                  <a:txBody>
+                    <a:bodyPr/>
+                    <a:lstStyle/>
+                    <a:p>
+                      <a:r>
+                        <a:rPr lang="en-US" sz="500" dirty="0">
+                          <a:solidFill>
+                            <a:schemeClr val="tx1"/>
+                          </a:solidFill>
+                        </a:rPr>
+                        <a:t>10</a:t>
+                      </a:r>
+                    </a:p>
+                  </a:txBody>
+                  <a:tcPr>
+                    <a:solidFill>
+                      <a:schemeClr val="bg1"/>
+                    </a:solidFill>
+                  </a:tcPr>
+                </a:tc>
+                <a:tc>
+                  <a:txBody>
+                    <a:bodyPr/>
+                    <a:lstStyle/>
+                    <a:p>
+                      <a:r>
+                        <a:rPr lang="en-US" sz="500" dirty="0">
+                          <a:solidFill>
+                            <a:schemeClr val="tx1"/>
+                          </a:solidFill>
+                        </a:rPr>
+                        <a:t>11</a:t>
+                      </a:r>
+                    </a:p>
+                  </a:txBody>
+                  <a:tcPr>
+                    <a:solidFill>
+                      <a:schemeClr val="bg1"/>
+                    </a:solidFill>
+                  </a:tcPr>
+                </a:tc>
+                <a:tc>
+                  <a:txBody>
+                    <a:bodyPr/>
+                    <a:lstStyle/>
+                    <a:p>
+                      <a:r>
+                        <a:rPr lang="en-US" sz="500" dirty="0">
+                          <a:solidFill>
+                            <a:schemeClr val="tx1"/>
+                          </a:solidFill>
+                        </a:rPr>
+                        <a:t>12</a:t>
+                      </a:r>
+                    </a:p>
+                  </a:txBody>
+                  <a:tcPr>
+                    <a:solidFill>
+                      <a:schemeClr val="bg1"/>
+                    </a:solidFill>
+                  </a:tcPr>
+                </a:tc>
+                <a:tc>
+                  <a:txBody>
+                    <a:bodyPr/>
+                    <a:lstStyle/>
+                    <a:p>
+                      <a:r>
+                        <a:rPr lang="en-US" sz="500" dirty="0">
+                          <a:solidFill>
+                            <a:schemeClr val="tx1"/>
+                          </a:solidFill>
+                        </a:rPr>
+                        <a:t>13</a:t>
+                      </a:r>
+                    </a:p>
+                  </a:txBody>
+                  <a:tcPr>
+                    <a:solidFill>
+                      <a:schemeClr val="bg1"/>
+                    </a:solidFill>
+                  </a:tcPr>
+                </a:tc>
+                <a:tc>
+                  <a:txBody>
+                    <a:bodyPr/>
+                    <a:lstStyle/>
+                    <a:p>
+                      <a:r>
+                        <a:rPr lang="en-US" sz="500" dirty="0">
+                          <a:solidFill>
+                            <a:schemeClr val="tx1"/>
+                          </a:solidFill>
+                        </a:rPr>
+                        <a:t>14</a:t>
+                      </a:r>
+                    </a:p>
+                  </a:txBody>
+                  <a:tcPr>
+                    <a:solidFill>
+                      <a:schemeClr val="bg1"/>
+                    </a:solidFill>
+                  </a:tcPr>
+                </a:tc>
+                <a:tc>
+                  <a:txBody>
+                    <a:bodyPr/>
+                    <a:lstStyle/>
+                    <a:p>
+                      <a:r>
+                        <a:rPr lang="en-US" sz="500" dirty="0">
+                          <a:solidFill>
+                            <a:schemeClr val="tx1"/>
+                          </a:solidFill>
+                        </a:rPr>
+                        <a:t>15</a:t>
+                      </a:r>
+                    </a:p>
+                  </a:txBody>
+                  <a:tcPr>
+                    <a:solidFill>
+                      <a:schemeClr val="bg1"/>
+                    </a:solidFill>
+                  </a:tcPr>
+                </a:tc>
+                <a:tc>
+                  <a:txBody>
+                    <a:bodyPr/>
+                    <a:lstStyle/>
+                    <a:p>
+                      <a:r>
+                        <a:rPr lang="en-US" sz="500" dirty="0">
+                          <a:solidFill>
+                            <a:schemeClr val="tx1"/>
+                          </a:solidFill>
+                        </a:rPr>
+                        <a:t>16</a:t>
+                      </a:r>
+                    </a:p>
+                  </a:txBody>
+                  <a:tcPr>
+                    <a:solidFill>
+                      <a:schemeClr val="bg1"/>
+                    </a:solidFill>
+                  </a:tcPr>
+                </a:tc>
+                <a:tc>
+                  <a:txBody>
+                    <a:bodyPr/>
+                    <a:lstStyle/>
+                    <a:p>
+                      <a:r>
+                        <a:rPr lang="en-US" sz="500" dirty="0">
+                          <a:solidFill>
+                            <a:schemeClr val="tx1"/>
+                          </a:solidFill>
+                        </a:rPr>
+                        <a:t>17</a:t>
+                      </a:r>
+                    </a:p>
+                  </a:txBody>
+                  <a:tcPr>
+                    <a:solidFill>
+                      <a:schemeClr val="bg1"/>
+                    </a:solidFill>
+                  </a:tcPr>
+                </a:tc>
+                <a:tc>
+                  <a:txBody>
+                    <a:bodyPr/>
+                    <a:lstStyle/>
+                    <a:p>
+                      <a:r>
+                        <a:rPr lang="en-US" sz="500" dirty="0">
+                          <a:solidFill>
+                            <a:schemeClr val="tx1"/>
+                          </a:solidFill>
+                        </a:rPr>
+                        <a:t>18</a:t>
+                      </a:r>
+                    </a:p>
+                  </a:txBody>
+                  <a:tcPr>
+                    <a:solidFill>
+                      <a:schemeClr val="bg1"/>
+                    </a:solidFill>
+                  </a:tcPr>
+                </a:tc>
+                <a:tc>
+                  <a:txBody>
+                    <a:bodyPr/>
+                    <a:lstStyle/>
+                    <a:p>
+                      <a:r>
+                        <a:rPr lang="en-US" sz="500" dirty="0">
+                          <a:solidFill>
+                            <a:schemeClr val="tx1"/>
+                          </a:solidFill>
+                        </a:rPr>
+                        <a:t>19</a:t>
+                      </a:r>
+                    </a:p>
+                  </a:txBody>
+                  <a:tcPr>
+                    <a:solidFill>
+                      <a:schemeClr val="bg1"/>
+                    </a:solidFill>
+                  </a:tcPr>
+                </a:tc>
+                <a:tc>
+                  <a:txBody>
+                    <a:bodyPr/>
+                    <a:lstStyle/>
+                    <a:p>
+                      <a:r>
+                        <a:rPr lang="en-US" sz="500" dirty="0">
+                          <a:solidFill>
+                            <a:schemeClr val="tx1"/>
+                          </a:solidFill>
+                        </a:rPr>
+                        <a:t>20</a:t>
+                      </a:r>
+                    </a:p>
+                  </a:txBody>
+                  <a:tcPr>
+                    <a:solidFill>
+                      <a:schemeClr val="bg1"/>
+                    </a:solidFill>
+                  </a:tcPr>
+                </a:tc>
+                <a:tc>
+                  <a:txBody>
+                    <a:bodyPr/>
+                    <a:lstStyle/>
+                    <a:p>
+                      <a:r>
+                        <a:rPr lang="en-US" sz="500" dirty="0">
+                          <a:solidFill>
+                            <a:schemeClr val="tx1"/>
+                          </a:solidFill>
+                        </a:rPr>
+                        <a:t>21</a:t>
+                      </a:r>
+                    </a:p>
+                  </a:txBody>
+                  <a:tcPr>
+                    <a:solidFill>
+                      <a:schemeClr val="bg1"/>
+                    </a:solidFill>
+                  </a:tcPr>
+                </a:tc>
+                <a:tc>
+                  <a:txBody>
+                    <a:bodyPr/>
+                    <a:lstStyle/>
+                    <a:p>
+                      <a:r>
+                        <a:rPr lang="en-US" sz="500" dirty="0">
+                          <a:solidFill>
+                            <a:schemeClr val="tx1"/>
+                          </a:solidFill>
+                        </a:rPr>
+                        <a:t>22</a:t>
+                      </a:r>
+                    </a:p>
+                  </a:txBody>
+                  <a:tcPr>
+                    <a:solidFill>
+                      <a:schemeClr val="bg1"/>
+                    </a:solidFill>
+                  </a:tcPr>
+                </a:tc>
+                <a:tc>
+                  <a:txBody>
+                    <a:bodyPr/>
+                    <a:lstStyle/>
+                    <a:p>
+                      <a:r>
+                        <a:rPr lang="en-US" sz="500" dirty="0">
+                          <a:solidFill>
+                            <a:schemeClr val="tx1"/>
+                          </a:solidFill>
+                        </a:rPr>
+                        <a:t>23</a:t>
+                      </a:r>
+                    </a:p>
+                  </a:txBody>
+                  <a:tcPr>
+                    <a:solidFill>
+                      <a:schemeClr val="bg1"/>
+                    </a:solidFill>
+                  </a:tcPr>
+                </a:tc>
+                <a:tc>
+                  <a:txBody>
+                    <a:bodyPr/>
+                    <a:lstStyle/>
+                    <a:p>
+                      <a:r>
+                        <a:rPr lang="en-US" sz="500" dirty="0">
+                          <a:solidFill>
+                            <a:schemeClr val="tx1"/>
+                          </a:solidFill>
+                        </a:rPr>
+                        <a:t>24</a:t>
+                      </a:r>
+                    </a:p>
+                  </a:txBody>
+                  <a:tcPr>
+                    <a:solidFill>
+                      <a:schemeClr val="bg1"/>
+                    </a:solidFill>
+                  </a:tcPr>
+                </a:tc>
+                <a:tc>
+                  <a:txBody>
+                    <a:bodyPr/>
+                    <a:lstStyle/>
+                    <a:p>
+                      <a:r>
+                        <a:rPr lang="en-US" sz="500" dirty="0">
+                          <a:solidFill>
+                            <a:schemeClr val="tx1"/>
+                          </a:solidFill>
+                        </a:rPr>
+                        <a:t>25</a:t>
+                      </a:r>
+                    </a:p>
+                  </a:txBody>
+                  <a:tcPr>
+                    <a:solidFill>
+                      <a:schemeClr val="bg1"/>
+                    </a:solidFill>
+                  </a:tcPr>
+                </a:tc>
+                <a:tc>
+                  <a:txBody>
+                    <a:bodyPr/>
+                    <a:lstStyle/>
+                    <a:p>
+                      <a:r>
+                        <a:rPr lang="en-US" sz="500" dirty="0">
+                          <a:solidFill>
+                            <a:schemeClr val="tx1"/>
+                          </a:solidFill>
+                        </a:rPr>
+                        <a:t>26</a:t>
+                      </a:r>
+                    </a:p>
+                  </a:txBody>
+                  <a:tcPr>
+                    <a:solidFill>
+                      <a:schemeClr val="bg1"/>
+                    </a:solidFill>
+                  </a:tcPr>
+                </a:tc>
+                <a:tc>
+                  <a:txBody>
+                    <a:bodyPr/>
+                    <a:lstStyle/>
+                    <a:p>
+                      <a:r>
+                        <a:rPr lang="en-US" sz="500" dirty="0">
+                          <a:solidFill>
+                            <a:schemeClr val="tx1"/>
+                          </a:solidFill>
+                        </a:rPr>
+                        <a:t>27</a:t>
+                      </a:r>
+                    </a:p>
+                  </a:txBody>
+                  <a:tcPr>
+                    <a:solidFill>
+                      <a:schemeClr val="bg1"/>
+                    </a:solidFill>
+                  </a:tcPr>
+                </a:tc>
+                <a:tc>
+                  <a:txBody>
+                    <a:bodyPr/>
+                    <a:lstStyle/>
+                    <a:p>
+                      <a:r>
+                        <a:rPr lang="en-US" sz="500" dirty="0">
+                          <a:solidFill>
+                            <a:schemeClr val="tx1"/>
+                          </a:solidFill>
+                        </a:rPr>
+                        <a:t>28</a:t>
+                      </a:r>
+                    </a:p>
+                  </a:txBody>
+                  <a:tcPr>
+                    <a:solidFill>
+                      <a:schemeClr val="bg1"/>
+                    </a:solidFill>
+                  </a:tcPr>
+                </a:tc>
+                <a:tc>
+                  <a:txBody>
+                    <a:bodyPr/>
+                    <a:lstStyle/>
+                    <a:p>
+                      <a:r>
+                        <a:rPr lang="en-US" sz="500" dirty="0">
+                          <a:solidFill>
+                            <a:schemeClr val="tx1"/>
+                          </a:solidFill>
+                        </a:rPr>
+                        <a:t>29</a:t>
+                      </a:r>
+                    </a:p>
+                  </a:txBody>
+                  <a:tcPr>
+                    <a:solidFill>
+                      <a:schemeClr val="bg1"/>
+                    </a:solidFill>
+                  </a:tcPr>
+                </a:tc>
+                <a:tc>
+                  <a:txBody>
+                    <a:bodyPr/>
+                    <a:lstStyle/>
+                    <a:p>
+                      <a:r>
+                        <a:rPr lang="en-US" sz="500" dirty="0">
+                          <a:solidFill>
+                            <a:schemeClr val="tx1"/>
+                          </a:solidFill>
+                        </a:rPr>
+                        <a:t>30</a:t>
+                      </a:r>
+                    </a:p>
+                  </a:txBody>
+                  <a:tcPr>
+                    <a:solidFill>
+                      <a:schemeClr val="bg1"/>
+                    </a:solidFill>
+                  </a:tcPr>
+                </a:tc>
+                <a:tc>
+                  <a:txBody>
+                    <a:bodyPr/>
+                    <a:lstStyle/>
+                    <a:p>
+                      <a:r>
+                        <a:rPr lang="en-US" sz="500" dirty="0">
+                          <a:solidFill>
+                            <a:schemeClr val="tx1"/>
+                          </a:solidFill>
+                        </a:rPr>
+                        <a:t>31</a:t>
+                      </a:r>
+                    </a:p>
+                  </a:txBody>
+                  <a:tcPr>
+                    <a:solidFill>
+                      <a:schemeClr val="bg1"/>
+                    </a:solidFill>
+                  </a:tcPr>
+                </a:tc>
+                <a:extLst>
+                  <a:ext uri="{0D108BD9-81ED-4DB2-BD59-A6C34878D82A}">
+                    <a16:rowId xmlns:a16="http://schemas.microsoft.com/office/drawing/2014/main" val="247343545"/>
+                  </a:ext>
+                </a:extLst>
+              </a:tr>
+            </a:tbl>
+          </a:graphicData>
+        </a:graphic>
+      </p:graphicFrame>
+    </p:spTree>
+    <p:extLst>
+      <p:ext uri="{BB962C8B-B14F-4D97-AF65-F5344CB8AC3E}">
+        <p14:creationId xmlns:p14="http://schemas.microsoft.com/office/powerpoint/2010/main" val="3857893770"/>
       </p:ext>
     </p:extLst>
   </p:cSld>

</xml_diff>

<commit_message>
Finish slides on bit/binary crash course
</commit_message>
<xml_diff>
--- a/Data_types and variables/Datatypes_variables.pptx
+++ b/Data_types and variables/Datatypes_variables.pptx
@@ -8,6 +8,7 @@
     <p:sldId id="256" r:id="rId2"/>
     <p:sldId id="257" r:id="rId3"/>
     <p:sldId id="258" r:id="rId4"/>
+    <p:sldId id="259" r:id="rId5"/>
   </p:sldIdLst>
   <p:sldSz cx="12192000" cy="6858000"/>
   <p:notesSz cx="6858000" cy="9144000"/>
@@ -339,7 +340,7 @@
             <a:fld id="{5586B75A-687E-405C-8A0B-8D00578BA2C3}" type="datetimeFigureOut">
               <a:rPr lang="en-US" dirty="0"/>
               <a:pPr/>
-              <a:t>5/5/2019</a:t>
+              <a:t>5/6/2019</a:t>
             </a:fld>
             <a:endParaRPr lang="en-US" dirty="0"/>
           </a:p>
@@ -506,7 +507,7 @@
             <a:fld id="{5586B75A-687E-405C-8A0B-8D00578BA2C3}" type="datetimeFigureOut">
               <a:rPr lang="en-US" dirty="0"/>
               <a:pPr/>
-              <a:t>5/5/2019</a:t>
+              <a:t>5/6/2019</a:t>
             </a:fld>
             <a:endParaRPr lang="en-US" dirty="0"/>
           </a:p>
@@ -683,7 +684,7 @@
             <a:fld id="{5586B75A-687E-405C-8A0B-8D00578BA2C3}" type="datetimeFigureOut">
               <a:rPr lang="en-US" dirty="0"/>
               <a:pPr/>
-              <a:t>5/5/2019</a:t>
+              <a:t>5/6/2019</a:t>
             </a:fld>
             <a:endParaRPr lang="en-US" dirty="0"/>
           </a:p>
@@ -850,7 +851,7 @@
             <a:fld id="{5586B75A-687E-405C-8A0B-8D00578BA2C3}" type="datetimeFigureOut">
               <a:rPr lang="en-US" dirty="0"/>
               <a:pPr/>
-              <a:t>5/5/2019</a:t>
+              <a:t>5/6/2019</a:t>
             </a:fld>
             <a:endParaRPr lang="en-US" dirty="0"/>
           </a:p>
@@ -1105,7 +1106,7 @@
             <a:fld id="{5586B75A-687E-405C-8A0B-8D00578BA2C3}" type="datetimeFigureOut">
               <a:rPr lang="en-US" dirty="0"/>
               <a:pPr/>
-              <a:t>5/5/2019</a:t>
+              <a:t>5/6/2019</a:t>
             </a:fld>
             <a:endParaRPr lang="en-US" dirty="0"/>
           </a:p>
@@ -1390,7 +1391,7 @@
             <a:fld id="{5586B75A-687E-405C-8A0B-8D00578BA2C3}" type="datetimeFigureOut">
               <a:rPr lang="en-US" dirty="0"/>
               <a:pPr/>
-              <a:t>5/5/2019</a:t>
+              <a:t>5/6/2019</a:t>
             </a:fld>
             <a:endParaRPr lang="en-US" dirty="0"/>
           </a:p>
@@ -1829,7 +1830,7 @@
             <a:fld id="{5586B75A-687E-405C-8A0B-8D00578BA2C3}" type="datetimeFigureOut">
               <a:rPr lang="en-US" dirty="0"/>
               <a:pPr/>
-              <a:t>5/5/2019</a:t>
+              <a:t>5/6/2019</a:t>
             </a:fld>
             <a:endParaRPr lang="en-US" dirty="0"/>
           </a:p>
@@ -1944,7 +1945,7 @@
             <a:fld id="{5586B75A-687E-405C-8A0B-8D00578BA2C3}" type="datetimeFigureOut">
               <a:rPr lang="en-US" dirty="0"/>
               <a:pPr/>
-              <a:t>5/5/2019</a:t>
+              <a:t>5/6/2019</a:t>
             </a:fld>
             <a:endParaRPr lang="en-US" dirty="0"/>
           </a:p>
@@ -2036,7 +2037,7 @@
             <a:fld id="{5586B75A-687E-405C-8A0B-8D00578BA2C3}" type="datetimeFigureOut">
               <a:rPr lang="en-US" dirty="0"/>
               <a:pPr/>
-              <a:t>5/5/2019</a:t>
+              <a:t>5/6/2019</a:t>
             </a:fld>
             <a:endParaRPr lang="en-US" dirty="0"/>
           </a:p>
@@ -2321,7 +2322,7 @@
             <a:fld id="{5586B75A-687E-405C-8A0B-8D00578BA2C3}" type="datetimeFigureOut">
               <a:rPr lang="en-US" dirty="0"/>
               <a:pPr/>
-              <a:t>5/5/2019</a:t>
+              <a:t>5/6/2019</a:t>
             </a:fld>
             <a:endParaRPr lang="en-US" dirty="0"/>
           </a:p>
@@ -2591,7 +2592,7 @@
             <a:fld id="{5586B75A-687E-405C-8A0B-8D00578BA2C3}" type="datetimeFigureOut">
               <a:rPr lang="en-US" dirty="0"/>
               <a:pPr/>
-              <a:t>5/5/2019</a:t>
+              <a:t>5/6/2019</a:t>
             </a:fld>
             <a:endParaRPr lang="en-US" dirty="0"/>
           </a:p>
@@ -2885,7 +2886,7 @@
             <a:fld id="{5586B75A-687E-405C-8A0B-8D00578BA2C3}" type="datetimeFigureOut">
               <a:rPr lang="en-US" dirty="0"/>
               <a:pPr/>
-              <a:t>5/5/2019</a:t>
+              <a:t>5/6/2019</a:t>
             </a:fld>
             <a:endParaRPr lang="en-US" dirty="0"/>
           </a:p>
@@ -3597,8 +3598,13 @@
             <a:pPr lvl="1"/>
             <a:r>
               <a:rPr lang="en-US" dirty="0"/>
-              <a:t>Signed = the number is always positive.</a:t>
-            </a:r>
+              <a:t>Signed = the number is </a:t>
+            </a:r>
+            <a:r>
+              <a:rPr lang="en-US"/>
+              <a:t>always positive.</a:t>
+            </a:r>
+            <a:endParaRPr lang="en-US" dirty="0"/>
           </a:p>
           <a:p>
             <a:pPr marL="502920" lvl="1" indent="0">
@@ -3659,7 +3665,10 @@
           <a:bodyPr/>
           <a:lstStyle/>
           <a:p>
-            <a:endParaRPr lang="en-US"/>
+            <a:r>
+              <a:rPr lang="en-US" dirty="0"/>
+              <a:t>Example of a 32 bit integer</a:t>
+            </a:r>
           </a:p>
         </p:txBody>
       </p:sp>
@@ -3679,7 +3688,12 @@
             <p:ph idx="1"/>
           </p:nvPr>
         </p:nvSpPr>
-        <p:spPr/>
+        <p:spPr>
+          <a:xfrm>
+            <a:off x="3869268" y="864108"/>
+            <a:ext cx="7315200" cy="5120640"/>
+          </a:xfrm>
+        </p:spPr>
         <p:txBody>
           <a:bodyPr/>
           <a:lstStyle/>
@@ -5314,10 +5328,707 @@
           </a:graphicData>
         </a:graphic>
       </p:graphicFrame>
+      <p:sp>
+        <p:nvSpPr>
+          <p:cNvPr id="6" name="TextBox 5">
+            <a:extLst>
+              <a:ext uri="{FF2B5EF4-FFF2-40B4-BE49-F238E27FC236}">
+                <a16:creationId xmlns:a16="http://schemas.microsoft.com/office/drawing/2014/main" id="{195D1DA3-7513-4308-9954-C3054CE06EDD}"/>
+              </a:ext>
+            </a:extLst>
+          </p:cNvPr>
+          <p:cNvSpPr txBox="1"/>
+          <p:nvPr/>
+        </p:nvSpPr>
+        <p:spPr>
+          <a:xfrm>
+            <a:off x="3690972" y="4350963"/>
+            <a:ext cx="7918042" cy="1754326"/>
+          </a:xfrm>
+          <a:prstGeom prst="rect">
+            <a:avLst/>
+          </a:prstGeom>
+          <a:noFill/>
+        </p:spPr>
+        <p:txBody>
+          <a:bodyPr wrap="square" rtlCol="0">
+            <a:spAutoFit/>
+          </a:bodyPr>
+          <a:lstStyle/>
+          <a:p>
+            <a:r>
+              <a:rPr lang="en-US" dirty="0"/>
+              <a:t>An integer is signed so we have 2^31  = 2147483648 different combinations or values that can represented. (-2147483648 to 2147483647)</a:t>
+            </a:r>
+          </a:p>
+          <a:p>
+            <a:endParaRPr lang="en-US" dirty="0"/>
+          </a:p>
+          <a:p>
+            <a:r>
+              <a:rPr lang="en-US" dirty="0"/>
+              <a:t>Same situation for int16 and int64…</a:t>
+            </a:r>
+          </a:p>
+          <a:p>
+            <a:r>
+              <a:rPr lang="en-US" dirty="0"/>
+              <a:t> </a:t>
+            </a:r>
+          </a:p>
+          <a:p>
+            <a:endParaRPr lang="en-US" dirty="0"/>
+          </a:p>
+        </p:txBody>
+      </p:sp>
     </p:spTree>
     <p:extLst>
       <p:ext uri="{BB962C8B-B14F-4D97-AF65-F5344CB8AC3E}">
         <p14:creationId xmlns:p14="http://schemas.microsoft.com/office/powerpoint/2010/main" val="3857893770"/>
+      </p:ext>
+    </p:extLst>
+  </p:cSld>
+  <p:clrMapOvr>
+    <a:masterClrMapping/>
+  </p:clrMapOvr>
+</p:sld>
+</file>
+
+<file path=ppt/slides/slide4.xml><?xml version="1.0" encoding="utf-8"?>
+<p:sld xmlns:a="http://schemas.openxmlformats.org/drawingml/2006/main" xmlns:r="http://schemas.openxmlformats.org/officeDocument/2006/relationships" xmlns:p="http://schemas.openxmlformats.org/presentationml/2006/main">
+  <p:cSld>
+    <p:spTree>
+      <p:nvGrpSpPr>
+        <p:cNvPr id="1" name=""/>
+        <p:cNvGrpSpPr/>
+        <p:nvPr/>
+      </p:nvGrpSpPr>
+      <p:grpSpPr>
+        <a:xfrm>
+          <a:off x="0" y="0"/>
+          <a:ext cx="0" cy="0"/>
+          <a:chOff x="0" y="0"/>
+          <a:chExt cx="0" cy="0"/>
+        </a:xfrm>
+      </p:grpSpPr>
+      <p:sp>
+        <p:nvSpPr>
+          <p:cNvPr id="2" name="Title 1">
+            <a:extLst>
+              <a:ext uri="{FF2B5EF4-FFF2-40B4-BE49-F238E27FC236}">
+                <a16:creationId xmlns:a16="http://schemas.microsoft.com/office/drawing/2014/main" id="{C27B98D1-9327-4592-9E74-8A4181E07E0A}"/>
+              </a:ext>
+            </a:extLst>
+          </p:cNvPr>
+          <p:cNvSpPr>
+            <a:spLocks noGrp="1"/>
+          </p:cNvSpPr>
+          <p:nvPr>
+            <p:ph type="title"/>
+          </p:nvPr>
+        </p:nvSpPr>
+        <p:spPr/>
+        <p:txBody>
+          <a:bodyPr/>
+          <a:lstStyle/>
+          <a:p>
+            <a:r>
+              <a:rPr lang="en-US" dirty="0"/>
+              <a:t>Quick overview of float </a:t>
+            </a:r>
+          </a:p>
+        </p:txBody>
+      </p:sp>
+      <p:sp>
+        <p:nvSpPr>
+          <p:cNvPr id="3" name="Content Placeholder 2">
+            <a:extLst>
+              <a:ext uri="{FF2B5EF4-FFF2-40B4-BE49-F238E27FC236}">
+                <a16:creationId xmlns:a16="http://schemas.microsoft.com/office/drawing/2014/main" id="{CDBA762E-2C1B-4DFB-918F-314F4DFF898B}"/>
+              </a:ext>
+            </a:extLst>
+          </p:cNvPr>
+          <p:cNvSpPr>
+            <a:spLocks noGrp="1"/>
+          </p:cNvSpPr>
+          <p:nvPr>
+            <p:ph idx="1"/>
+          </p:nvPr>
+        </p:nvSpPr>
+        <p:spPr>
+          <a:xfrm>
+            <a:off x="3735779" y="0"/>
+            <a:ext cx="7315200" cy="5120640"/>
+          </a:xfrm>
+        </p:spPr>
+        <p:txBody>
+          <a:bodyPr/>
+          <a:lstStyle/>
+          <a:p>
+            <a:r>
+              <a:rPr lang="en-US" dirty="0"/>
+              <a:t>Float32 = </a:t>
+            </a:r>
+          </a:p>
+        </p:txBody>
+      </p:sp>
+      <p:pic>
+        <p:nvPicPr>
+          <p:cNvPr id="1029" name="Picture 5" descr="Float example.svg">
+            <a:extLst>
+              <a:ext uri="{FF2B5EF4-FFF2-40B4-BE49-F238E27FC236}">
+                <a16:creationId xmlns:a16="http://schemas.microsoft.com/office/drawing/2014/main" id="{1EF6302D-3538-43FF-B063-E887B87D0425}"/>
+              </a:ext>
+            </a:extLst>
+          </p:cNvPr>
+          <p:cNvPicPr>
+            <a:picLocks noChangeAspect="1" noChangeArrowheads="1"/>
+          </p:cNvPicPr>
+          <p:nvPr/>
+        </p:nvPicPr>
+        <p:blipFill>
+          <a:blip r:embed="rId2">
+            <a:extLst>
+              <a:ext uri="{28A0092B-C50C-407E-A947-70E740481C1C}">
+                <a14:useLocalDpi xmlns:a14="http://schemas.microsoft.com/office/drawing/2010/main" val="0"/>
+              </a:ext>
+            </a:extLst>
+          </a:blip>
+          <a:srcRect/>
+          <a:stretch>
+            <a:fillRect/>
+          </a:stretch>
+        </p:blipFill>
+        <p:spPr bwMode="auto">
+          <a:xfrm>
+            <a:off x="3802523" y="2758114"/>
+            <a:ext cx="5619750" cy="714375"/>
+          </a:xfrm>
+          <a:prstGeom prst="rect">
+            <a:avLst/>
+          </a:prstGeom>
+          <a:noFill/>
+          <a:extLst>
+            <a:ext uri="{909E8E84-426E-40DD-AFC4-6F175D3DCCD1}">
+              <a14:hiddenFill xmlns:a14="http://schemas.microsoft.com/office/drawing/2010/main">
+                <a:solidFill>
+                  <a:srgbClr val="FFFFFF"/>
+                </a:solidFill>
+              </a14:hiddenFill>
+            </a:ext>
+          </a:extLst>
+        </p:spPr>
+      </p:pic>
+      <p:cxnSp>
+        <p:nvCxnSpPr>
+          <p:cNvPr id="8" name="Straight Arrow Connector 7">
+            <a:extLst>
+              <a:ext uri="{FF2B5EF4-FFF2-40B4-BE49-F238E27FC236}">
+                <a16:creationId xmlns:a16="http://schemas.microsoft.com/office/drawing/2014/main" id="{BF7C7705-77C1-42D6-9243-91A1D5BAC7CF}"/>
+              </a:ext>
+            </a:extLst>
+          </p:cNvPr>
+          <p:cNvCxnSpPr/>
+          <p:nvPr/>
+        </p:nvCxnSpPr>
+        <p:spPr>
+          <a:xfrm flipH="1">
+            <a:off x="8536625" y="2102453"/>
+            <a:ext cx="454976" cy="655661"/>
+          </a:xfrm>
+          <a:prstGeom prst="straightConnector1">
+            <a:avLst/>
+          </a:prstGeom>
+          <a:ln>
+            <a:tailEnd type="triangle"/>
+          </a:ln>
+        </p:spPr>
+        <p:style>
+          <a:lnRef idx="2">
+            <a:schemeClr val="accent1"/>
+          </a:lnRef>
+          <a:fillRef idx="0">
+            <a:schemeClr val="accent1"/>
+          </a:fillRef>
+          <a:effectRef idx="1">
+            <a:schemeClr val="accent1"/>
+          </a:effectRef>
+          <a:fontRef idx="minor">
+            <a:schemeClr val="tx1"/>
+          </a:fontRef>
+        </p:style>
+      </p:cxnSp>
+      <p:sp>
+        <p:nvSpPr>
+          <p:cNvPr id="9" name="Rectangle 8">
+            <a:extLst>
+              <a:ext uri="{FF2B5EF4-FFF2-40B4-BE49-F238E27FC236}">
+                <a16:creationId xmlns:a16="http://schemas.microsoft.com/office/drawing/2014/main" id="{7B86087E-74B0-4554-B1EB-5AD7DECF7BAB}"/>
+              </a:ext>
+            </a:extLst>
+          </p:cNvPr>
+          <p:cNvSpPr/>
+          <p:nvPr/>
+        </p:nvSpPr>
+        <p:spPr>
+          <a:xfrm>
+            <a:off x="5892357" y="1613125"/>
+            <a:ext cx="5743512" cy="400110"/>
+          </a:xfrm>
+          <a:prstGeom prst="rect">
+            <a:avLst/>
+          </a:prstGeom>
+          <a:noFill/>
+        </p:spPr>
+        <p:txBody>
+          <a:bodyPr wrap="square" lIns="91440" tIns="45720" rIns="91440" bIns="45720">
+            <a:spAutoFit/>
+          </a:bodyPr>
+          <a:lstStyle/>
+          <a:p>
+            <a:pPr algn="ctr"/>
+            <a:r>
+              <a:rPr lang="en-US" sz="2000" b="0" cap="none" spc="0" dirty="0">
+                <a:ln w="0"/>
+                <a:solidFill>
+                  <a:schemeClr val="accent1"/>
+                </a:solidFill>
+                <a:effectLst>
+                  <a:outerShdw blurRad="38100" dist="25400" dir="5400000" algn="ctr" rotWithShape="0">
+                    <a:srgbClr val="6E747A">
+                      <a:alpha val="43000"/>
+                    </a:srgbClr>
+                  </a:outerShdw>
+                </a:effectLst>
+              </a:rPr>
+              <a:t>How float value is represented </a:t>
+            </a:r>
+          </a:p>
+        </p:txBody>
+      </p:sp>
+      <mc:AlternateContent xmlns:mc="http://schemas.openxmlformats.org/markup-compatibility/2006">
+        <mc:Choice xmlns:a14="http://schemas.microsoft.com/office/drawing/2010/main" Requires="a14">
+          <p:sp>
+            <p:nvSpPr>
+              <p:cNvPr id="10" name="TextBox 9">
+                <a:extLst>
+                  <a:ext uri="{FF2B5EF4-FFF2-40B4-BE49-F238E27FC236}">
+                    <a16:creationId xmlns:a16="http://schemas.microsoft.com/office/drawing/2014/main" id="{484601E1-925F-4939-9437-CF78246B29F7}"/>
+                  </a:ext>
+                </a:extLst>
+              </p:cNvPr>
+              <p:cNvSpPr txBox="1"/>
+              <p:nvPr/>
+            </p:nvSpPr>
+            <p:spPr>
+              <a:xfrm>
+                <a:off x="3610879" y="3617553"/>
+                <a:ext cx="7969296" cy="3124510"/>
+              </a:xfrm>
+              <a:prstGeom prst="rect">
+                <a:avLst/>
+              </a:prstGeom>
+              <a:noFill/>
+            </p:spPr>
+            <p:txBody>
+              <a:bodyPr wrap="square" rtlCol="0">
+                <a:spAutoFit/>
+              </a:bodyPr>
+              <a:lstStyle/>
+              <a:p>
+                <a:r>
+                  <a:rPr lang="en-US" sz="1600" dirty="0"/>
+                  <a:t>How do I read this? </a:t>
+                </a:r>
+              </a:p>
+              <a:p>
+                <a:r>
+                  <a:rPr lang="en-US" sz="1600" dirty="0"/>
+                  <a:t>Sign = positive or negative value</a:t>
+                </a:r>
+              </a:p>
+              <a:p>
+                <a:r>
+                  <a:rPr lang="en-US" sz="1600" dirty="0"/>
+                  <a:t>Exponent = 8 bit signed integer from -128 to 127</a:t>
+                </a:r>
+              </a:p>
+              <a:p>
+                <a:r>
+                  <a:rPr lang="en-US" sz="1600" dirty="0"/>
+                  <a:t>Fraction = 23 bits represents fractional part of the decimal value</a:t>
+                </a:r>
+              </a:p>
+              <a:p>
+                <a:endParaRPr lang="en-US" sz="1600" dirty="0"/>
+              </a:p>
+              <a:p>
+                <a:r>
+                  <a:rPr lang="en-US" sz="1600" dirty="0"/>
+                  <a:t>Formula: </a:t>
+                </a:r>
+                <a14:m>
+                  <m:oMath xmlns:m="http://schemas.openxmlformats.org/officeDocument/2006/math">
+                    <m:r>
+                      <a:rPr lang="en-US" sz="1600" b="0" i="1" smtClean="0">
+                        <a:latin typeface="Cambria Math" panose="02040503050406030204" pitchFamily="18" charset="0"/>
+                      </a:rPr>
+                      <m:t>𝑣𝑎𝑙𝑢𝑒</m:t>
+                    </m:r>
+                    <m:r>
+                      <a:rPr lang="en-US" sz="1600" b="0" i="1" smtClean="0">
+                        <a:latin typeface="Cambria Math" panose="02040503050406030204" pitchFamily="18" charset="0"/>
+                      </a:rPr>
+                      <m:t>=(−1)^</m:t>
+                    </m:r>
+                    <m:r>
+                      <a:rPr lang="en-US" sz="1600" b="0" i="1" smtClean="0">
+                        <a:latin typeface="Cambria Math" panose="02040503050406030204" pitchFamily="18" charset="0"/>
+                      </a:rPr>
+                      <m:t>𝑠𝑖𝑔𝑛</m:t>
+                    </m:r>
+                    <m:r>
+                      <a:rPr lang="en-US" sz="1600" b="0" i="1" smtClean="0">
+                        <a:latin typeface="Cambria Math" panose="02040503050406030204" pitchFamily="18" charset="0"/>
+                      </a:rPr>
+                      <m:t>∗2^(</m:t>
+                    </m:r>
+                    <m:r>
+                      <a:rPr lang="en-US" sz="1600" b="0" i="1" smtClean="0">
+                        <a:latin typeface="Cambria Math" panose="02040503050406030204" pitchFamily="18" charset="0"/>
+                      </a:rPr>
+                      <m:t>𝑒</m:t>
+                    </m:r>
+                    <m:r>
+                      <a:rPr lang="en-US" sz="1600" b="0" i="1" smtClean="0">
+                        <a:latin typeface="Cambria Math" panose="02040503050406030204" pitchFamily="18" charset="0"/>
+                      </a:rPr>
+                      <m:t>−127)∗(1</m:t>
+                    </m:r>
+                    <m:r>
+                      <a:rPr lang="en-US" sz="1600" b="0" i="1" smtClean="0">
+                        <a:latin typeface="Cambria Math" panose="02040503050406030204" pitchFamily="18" charset="0"/>
+                      </a:rPr>
+                      <m:t>+</m:t>
+                    </m:r>
+                    <m:nary>
+                      <m:naryPr>
+                        <m:chr m:val="∑"/>
+                        <m:ctrlPr>
+                          <a:rPr lang="en-US" sz="1600" b="0" i="1" smtClean="0">
+                            <a:latin typeface="Cambria Math" panose="02040503050406030204" pitchFamily="18" charset="0"/>
+                          </a:rPr>
+                        </m:ctrlPr>
+                      </m:naryPr>
+                      <m:sub>
+                        <m:r>
+                          <m:rPr>
+                            <m:brk m:alnAt="23"/>
+                          </m:rPr>
+                          <a:rPr lang="en-US" sz="1600" b="0" i="1" smtClean="0">
+                            <a:latin typeface="Cambria Math" panose="02040503050406030204" pitchFamily="18" charset="0"/>
+                          </a:rPr>
+                          <m:t>1</m:t>
+                        </m:r>
+                      </m:sub>
+                      <m:sup>
+                        <m:r>
+                          <a:rPr lang="en-US" sz="1600" b="0" i="1" smtClean="0">
+                            <a:latin typeface="Cambria Math" panose="02040503050406030204" pitchFamily="18" charset="0"/>
+                          </a:rPr>
+                          <m:t>23</m:t>
+                        </m:r>
+                      </m:sup>
+                      <m:e>
+                        <m:sSub>
+                          <m:sSubPr>
+                            <m:ctrlPr>
+                              <a:rPr lang="en-US" sz="1600" b="0" i="1" smtClean="0">
+                                <a:latin typeface="Cambria Math" panose="02040503050406030204" pitchFamily="18" charset="0"/>
+                              </a:rPr>
+                            </m:ctrlPr>
+                          </m:sSubPr>
+                          <m:e>
+                            <m:r>
+                              <a:rPr lang="en-US" sz="1600" b="0" i="1" smtClean="0">
+                                <a:latin typeface="Cambria Math" panose="02040503050406030204" pitchFamily="18" charset="0"/>
+                              </a:rPr>
+                              <m:t>𝑏</m:t>
+                            </m:r>
+                          </m:e>
+                          <m:sub>
+                            <m:r>
+                              <a:rPr lang="en-US" sz="1600" b="0" i="1" smtClean="0">
+                                <a:latin typeface="Cambria Math" panose="02040503050406030204" pitchFamily="18" charset="0"/>
+                              </a:rPr>
+                              <m:t>23−</m:t>
+                            </m:r>
+                            <m:r>
+                              <a:rPr lang="en-US" sz="1600" b="0" i="1" smtClean="0">
+                                <a:latin typeface="Cambria Math" panose="02040503050406030204" pitchFamily="18" charset="0"/>
+                              </a:rPr>
+                              <m:t>𝑖</m:t>
+                            </m:r>
+                          </m:sub>
+                        </m:sSub>
+                        <m:sSup>
+                          <m:sSupPr>
+                            <m:ctrlPr>
+                              <a:rPr lang="en-US" sz="1600" b="0" i="1" smtClean="0">
+                                <a:latin typeface="Cambria Math" panose="02040503050406030204" pitchFamily="18" charset="0"/>
+                              </a:rPr>
+                            </m:ctrlPr>
+                          </m:sSupPr>
+                          <m:e>
+                            <m:r>
+                              <a:rPr lang="en-US" sz="1600" b="0" i="1" smtClean="0">
+                                <a:latin typeface="Cambria Math" panose="02040503050406030204" pitchFamily="18" charset="0"/>
+                              </a:rPr>
+                              <m:t>2</m:t>
+                            </m:r>
+                          </m:e>
+                          <m:sup>
+                            <m:r>
+                              <a:rPr lang="en-US" sz="1600" b="0" i="1" smtClean="0">
+                                <a:latin typeface="Cambria Math" panose="02040503050406030204" pitchFamily="18" charset="0"/>
+                              </a:rPr>
+                              <m:t>−</m:t>
+                            </m:r>
+                            <m:r>
+                              <a:rPr lang="en-US" sz="1600" b="0" i="1" smtClean="0">
+                                <a:latin typeface="Cambria Math" panose="02040503050406030204" pitchFamily="18" charset="0"/>
+                              </a:rPr>
+                              <m:t>𝑖</m:t>
+                            </m:r>
+                          </m:sup>
+                        </m:sSup>
+                      </m:e>
+                    </m:nary>
+                    <m:r>
+                      <a:rPr lang="en-US" sz="1600" b="0" i="1" smtClean="0">
+                        <a:latin typeface="Cambria Math" panose="02040503050406030204" pitchFamily="18" charset="0"/>
+                      </a:rPr>
+                      <m:t>)</m:t>
+                    </m:r>
+                  </m:oMath>
+                </a14:m>
+                <a:endParaRPr lang="en-US" sz="1600" dirty="0"/>
+              </a:p>
+              <a:p>
+                <a:r>
+                  <a:rPr lang="en-US" sz="1600" dirty="0"/>
+                  <a:t>In this example</a:t>
+                </a:r>
+              </a:p>
+              <a:p>
+                <a:pPr marL="285750" indent="-285750">
+                  <a:buFont typeface="Arial" panose="020B0604020202020204" pitchFamily="34" charset="0"/>
+                  <a:buChar char="•"/>
+                </a:pPr>
+                <a:r>
+                  <a:rPr lang="en-US" sz="1400" dirty="0"/>
+                  <a:t>Sign = bit 31 = 0 = (-1)^(0) = 1</a:t>
+                </a:r>
+              </a:p>
+              <a:p>
+                <a:pPr marL="285750" indent="-285750">
+                  <a:buFont typeface="Arial" panose="020B0604020202020204" pitchFamily="34" charset="0"/>
+                  <a:buChar char="•"/>
+                </a:pPr>
+                <a:r>
+                  <a:rPr lang="en-US" sz="1400" dirty="0"/>
+                  <a:t>2^(124-127) = 2^(-3) = .125</a:t>
+                </a:r>
+              </a:p>
+              <a:p>
+                <a:pPr marL="285750" indent="-285750">
+                  <a:buFont typeface="Arial" panose="020B0604020202020204" pitchFamily="34" charset="0"/>
+                  <a:buChar char="•"/>
+                </a:pPr>
+                <a14:m>
+                  <m:oMath xmlns:m="http://schemas.openxmlformats.org/officeDocument/2006/math">
+                    <m:r>
+                      <a:rPr lang="en-US" sz="1400" i="1">
+                        <a:latin typeface="Cambria Math" panose="02040503050406030204" pitchFamily="18" charset="0"/>
+                      </a:rPr>
+                      <m:t>1+</m:t>
+                    </m:r>
+                    <m:nary>
+                      <m:naryPr>
+                        <m:chr m:val="∑"/>
+                        <m:ctrlPr>
+                          <a:rPr lang="en-US" sz="1400" i="1">
+                            <a:latin typeface="Cambria Math" panose="02040503050406030204" pitchFamily="18" charset="0"/>
+                          </a:rPr>
+                        </m:ctrlPr>
+                      </m:naryPr>
+                      <m:sub>
+                        <m:r>
+                          <m:rPr>
+                            <m:brk m:alnAt="23"/>
+                          </m:rPr>
+                          <a:rPr lang="en-US" sz="1400" i="1">
+                            <a:latin typeface="Cambria Math" panose="02040503050406030204" pitchFamily="18" charset="0"/>
+                          </a:rPr>
+                          <m:t>1</m:t>
+                        </m:r>
+                      </m:sub>
+                      <m:sup>
+                        <m:r>
+                          <a:rPr lang="en-US" sz="1400" i="1">
+                            <a:latin typeface="Cambria Math" panose="02040503050406030204" pitchFamily="18" charset="0"/>
+                          </a:rPr>
+                          <m:t>23</m:t>
+                        </m:r>
+                      </m:sup>
+                      <m:e>
+                        <m:sSub>
+                          <m:sSubPr>
+                            <m:ctrlPr>
+                              <a:rPr lang="en-US" sz="1400" i="1">
+                                <a:latin typeface="Cambria Math" panose="02040503050406030204" pitchFamily="18" charset="0"/>
+                              </a:rPr>
+                            </m:ctrlPr>
+                          </m:sSubPr>
+                          <m:e>
+                            <m:r>
+                              <a:rPr lang="en-US" sz="1400" i="1">
+                                <a:latin typeface="Cambria Math" panose="02040503050406030204" pitchFamily="18" charset="0"/>
+                              </a:rPr>
+                              <m:t>𝑏</m:t>
+                            </m:r>
+                          </m:e>
+                          <m:sub>
+                            <m:r>
+                              <a:rPr lang="en-US" sz="1400" i="1">
+                                <a:latin typeface="Cambria Math" panose="02040503050406030204" pitchFamily="18" charset="0"/>
+                              </a:rPr>
+                              <m:t>23−</m:t>
+                            </m:r>
+                            <m:r>
+                              <a:rPr lang="en-US" sz="1400" i="1">
+                                <a:latin typeface="Cambria Math" panose="02040503050406030204" pitchFamily="18" charset="0"/>
+                              </a:rPr>
+                              <m:t>𝑖</m:t>
+                            </m:r>
+                          </m:sub>
+                        </m:sSub>
+                        <m:sSup>
+                          <m:sSupPr>
+                            <m:ctrlPr>
+                              <a:rPr lang="en-US" sz="1400" i="1">
+                                <a:latin typeface="Cambria Math" panose="02040503050406030204" pitchFamily="18" charset="0"/>
+                              </a:rPr>
+                            </m:ctrlPr>
+                          </m:sSupPr>
+                          <m:e>
+                            <m:r>
+                              <a:rPr lang="en-US" sz="1400" i="1">
+                                <a:latin typeface="Cambria Math" panose="02040503050406030204" pitchFamily="18" charset="0"/>
+                              </a:rPr>
+                              <m:t>2</m:t>
+                            </m:r>
+                          </m:e>
+                          <m:sup>
+                            <m:r>
+                              <a:rPr lang="en-US" sz="1400" i="1">
+                                <a:latin typeface="Cambria Math" panose="02040503050406030204" pitchFamily="18" charset="0"/>
+                              </a:rPr>
+                              <m:t>−</m:t>
+                            </m:r>
+                            <m:r>
+                              <a:rPr lang="en-US" sz="1400" i="1">
+                                <a:latin typeface="Cambria Math" panose="02040503050406030204" pitchFamily="18" charset="0"/>
+                              </a:rPr>
+                              <m:t>𝑖</m:t>
+                            </m:r>
+                          </m:sup>
+                        </m:sSup>
+                      </m:e>
+                    </m:nary>
+                  </m:oMath>
+                </a14:m>
+                <a:r>
+                  <a:rPr lang="en-US" sz="1400" dirty="0"/>
+                  <a:t> = 1+ (1*2^(-2) + 0*2^(-3)+0*2^(-4)…+0*2^(-23)) = 1 + .25 = 1.25</a:t>
+                </a:r>
+              </a:p>
+              <a:p>
+                <a:pPr marL="285750" indent="-285750">
+                  <a:buFont typeface="Arial" panose="020B0604020202020204" pitchFamily="34" charset="0"/>
+                  <a:buChar char="•"/>
+                </a:pPr>
+                <a:r>
+                  <a:rPr lang="en-US" sz="1400" dirty="0"/>
+                  <a:t>Final calculation all together (1) * (.125) * (1.25) = 0.15625</a:t>
+                </a:r>
+              </a:p>
+              <a:p>
+                <a:endParaRPr lang="en-US" sz="1400" dirty="0"/>
+              </a:p>
+              <a:p>
+                <a:r>
+                  <a:rPr lang="en-US" sz="1400" dirty="0"/>
+                  <a:t>Float64 is similar but is </a:t>
+                </a:r>
+                <a:r>
+                  <a:rPr lang="en-US" sz="1400"/>
+                  <a:t>more accurate.</a:t>
+                </a:r>
+                <a:endParaRPr lang="en-US" sz="1400" dirty="0"/>
+              </a:p>
+            </p:txBody>
+          </p:sp>
+        </mc:Choice>
+        <mc:Fallback>
+          <p:sp>
+            <p:nvSpPr>
+              <p:cNvPr id="10" name="TextBox 9">
+                <a:extLst>
+                  <a:ext uri="{FF2B5EF4-FFF2-40B4-BE49-F238E27FC236}">
+                    <a16:creationId xmlns:a16="http://schemas.microsoft.com/office/drawing/2014/main" id="{484601E1-925F-4939-9437-CF78246B29F7}"/>
+                  </a:ext>
+                </a:extLst>
+              </p:cNvPr>
+              <p:cNvSpPr txBox="1">
+                <a:spLocks noRot="1" noChangeAspect="1" noMove="1" noResize="1" noEditPoints="1" noAdjustHandles="1" noChangeArrowheads="1" noChangeShapeType="1" noTextEdit="1"/>
+              </p:cNvSpPr>
+              <p:nvPr/>
+            </p:nvSpPr>
+            <p:spPr>
+              <a:xfrm>
+                <a:off x="3610879" y="3617553"/>
+                <a:ext cx="7969296" cy="3124510"/>
+              </a:xfrm>
+              <a:prstGeom prst="rect">
+                <a:avLst/>
+              </a:prstGeom>
+              <a:blipFill>
+                <a:blip r:embed="rId3"/>
+                <a:stretch>
+                  <a:fillRect l="-382" t="-585" b="-1170"/>
+                </a:stretch>
+              </a:blipFill>
+            </p:spPr>
+            <p:txBody>
+              <a:bodyPr/>
+              <a:lstStyle/>
+              <a:p>
+                <a:r>
+                  <a:rPr lang="en-US">
+                    <a:noFill/>
+                  </a:rPr>
+                  <a:t> </a:t>
+                </a:r>
+              </a:p>
+            </p:txBody>
+          </p:sp>
+        </mc:Fallback>
+      </mc:AlternateContent>
+    </p:spTree>
+    <p:extLst>
+      <p:ext uri="{BB962C8B-B14F-4D97-AF65-F5344CB8AC3E}">
+        <p14:creationId xmlns:p14="http://schemas.microsoft.com/office/powerpoint/2010/main" val="2581461958"/>
       </p:ext>
     </p:extLst>
   </p:cSld>

</xml_diff>

<commit_message>
Add zero value information for uninitialized variables
</commit_message>
<xml_diff>
--- a/Data_types and variables/Datatypes_variables.pptx
+++ b/Data_types and variables/Datatypes_variables.pptx
@@ -9,6 +9,7 @@
     <p:sldId id="257" r:id="rId3"/>
     <p:sldId id="258" r:id="rId4"/>
     <p:sldId id="259" r:id="rId5"/>
+    <p:sldId id="260" r:id="rId6"/>
   </p:sldIdLst>
   <p:sldSz cx="12192000" cy="6858000"/>
   <p:notesSz cx="6858000" cy="9144000"/>
@@ -5969,13 +5970,8 @@
               <a:p>
                 <a:r>
                   <a:rPr lang="en-US" sz="1400" dirty="0"/>
-                  <a:t>Float64 is similar but is </a:t>
+                  <a:t>Float64 is similar but is more accurate.</a:t>
                 </a:r>
-                <a:r>
-                  <a:rPr lang="en-US" sz="1400"/>
-                  <a:t>more accurate.</a:t>
-                </a:r>
-                <a:endParaRPr lang="en-US" sz="1400" dirty="0"/>
               </a:p>
             </p:txBody>
           </p:sp>
@@ -6029,6 +6025,159 @@
     <p:extLst>
       <p:ext uri="{BB962C8B-B14F-4D97-AF65-F5344CB8AC3E}">
         <p14:creationId xmlns:p14="http://schemas.microsoft.com/office/powerpoint/2010/main" val="2581461958"/>
+      </p:ext>
+    </p:extLst>
+  </p:cSld>
+  <p:clrMapOvr>
+    <a:masterClrMapping/>
+  </p:clrMapOvr>
+</p:sld>
+</file>
+
+<file path=ppt/slides/slide5.xml><?xml version="1.0" encoding="utf-8"?>
+<p:sld xmlns:a="http://schemas.openxmlformats.org/drawingml/2006/main" xmlns:r="http://schemas.openxmlformats.org/officeDocument/2006/relationships" xmlns:p="http://schemas.openxmlformats.org/presentationml/2006/main">
+  <p:cSld>
+    <p:spTree>
+      <p:nvGrpSpPr>
+        <p:cNvPr id="1" name=""/>
+        <p:cNvGrpSpPr/>
+        <p:nvPr/>
+      </p:nvGrpSpPr>
+      <p:grpSpPr>
+        <a:xfrm>
+          <a:off x="0" y="0"/>
+          <a:ext cx="0" cy="0"/>
+          <a:chOff x="0" y="0"/>
+          <a:chExt cx="0" cy="0"/>
+        </a:xfrm>
+      </p:grpSpPr>
+      <p:sp>
+        <p:nvSpPr>
+          <p:cNvPr id="2" name="Title 1">
+            <a:extLst>
+              <a:ext uri="{FF2B5EF4-FFF2-40B4-BE49-F238E27FC236}">
+                <a16:creationId xmlns:a16="http://schemas.microsoft.com/office/drawing/2014/main" id="{BF5B9198-AAA3-480D-BFC8-B385B8858B7F}"/>
+              </a:ext>
+            </a:extLst>
+          </p:cNvPr>
+          <p:cNvSpPr>
+            <a:spLocks noGrp="1"/>
+          </p:cNvSpPr>
+          <p:nvPr>
+            <p:ph type="title"/>
+          </p:nvPr>
+        </p:nvSpPr>
+        <p:spPr/>
+        <p:txBody>
+          <a:bodyPr/>
+          <a:lstStyle/>
+          <a:p>
+            <a:r>
+              <a:rPr lang="en-US" dirty="0"/>
+              <a:t>Declaring Variables</a:t>
+            </a:r>
+          </a:p>
+        </p:txBody>
+      </p:sp>
+      <p:pic>
+        <p:nvPicPr>
+          <p:cNvPr id="5" name="Content Placeholder 4">
+            <a:extLst>
+              <a:ext uri="{FF2B5EF4-FFF2-40B4-BE49-F238E27FC236}">
+                <a16:creationId xmlns:a16="http://schemas.microsoft.com/office/drawing/2014/main" id="{6F3039D9-E0FD-4FA2-AEA6-B85D341E42C8}"/>
+              </a:ext>
+            </a:extLst>
+          </p:cNvPr>
+          <p:cNvPicPr>
+            <a:picLocks noGrp="1" noChangeAspect="1"/>
+          </p:cNvPicPr>
+          <p:nvPr>
+            <p:ph idx="1"/>
+          </p:nvPr>
+        </p:nvPicPr>
+        <p:blipFill>
+          <a:blip r:embed="rId2"/>
+          <a:stretch>
+            <a:fillRect/>
+          </a:stretch>
+        </p:blipFill>
+        <p:spPr>
+          <a:xfrm>
+            <a:off x="3660920" y="764424"/>
+            <a:ext cx="7315200" cy="1151386"/>
+          </a:xfrm>
+        </p:spPr>
+      </p:pic>
+      <p:sp>
+        <p:nvSpPr>
+          <p:cNvPr id="7" name="TextBox 6">
+            <a:extLst>
+              <a:ext uri="{FF2B5EF4-FFF2-40B4-BE49-F238E27FC236}">
+                <a16:creationId xmlns:a16="http://schemas.microsoft.com/office/drawing/2014/main" id="{845B9804-2586-491E-B9FA-7A5ED5D7080A}"/>
+              </a:ext>
+            </a:extLst>
+          </p:cNvPr>
+          <p:cNvSpPr txBox="1"/>
+          <p:nvPr/>
+        </p:nvSpPr>
+        <p:spPr>
+          <a:xfrm>
+            <a:off x="3616036" y="2523506"/>
+            <a:ext cx="7897091" cy="1200329"/>
+          </a:xfrm>
+          <a:prstGeom prst="rect">
+            <a:avLst/>
+          </a:prstGeom>
+          <a:noFill/>
+        </p:spPr>
+        <p:txBody>
+          <a:bodyPr wrap="square" rtlCol="0">
+            <a:spAutoFit/>
+          </a:bodyPr>
+          <a:lstStyle/>
+          <a:p>
+            <a:r>
+              <a:rPr lang="en-US" dirty="0"/>
+              <a:t>Variables declared without an initialized value are given their </a:t>
+            </a:r>
+            <a:r>
+              <a:rPr lang="en-US" i="1" dirty="0"/>
+              <a:t>zero value</a:t>
+            </a:r>
+            <a:r>
+              <a:rPr lang="en-US" dirty="0"/>
+              <a:t>.</a:t>
+            </a:r>
+          </a:p>
+          <a:p>
+            <a:r>
+              <a:rPr lang="en-US" dirty="0"/>
+              <a:t>	- 0 for numeric types</a:t>
+            </a:r>
+          </a:p>
+          <a:p>
+            <a:r>
+              <a:rPr lang="en-US" dirty="0"/>
+              <a:t>	- false for Boolean</a:t>
+            </a:r>
+          </a:p>
+          <a:p>
+            <a:r>
+              <a:rPr lang="en-US" dirty="0"/>
+              <a:t>	- “” empty string </a:t>
+            </a:r>
+            <a:r>
+              <a:rPr lang="en-US"/>
+              <a:t>for strings</a:t>
+            </a:r>
+            <a:endParaRPr lang="en-US" dirty="0"/>
+          </a:p>
+        </p:txBody>
+      </p:sp>
+    </p:spTree>
+    <p:extLst>
+      <p:ext uri="{BB962C8B-B14F-4D97-AF65-F5344CB8AC3E}">
+        <p14:creationId xmlns:p14="http://schemas.microsoft.com/office/powerpoint/2010/main" val="981128771"/>
       </p:ext>
     </p:extLst>
   </p:cSld>

</xml_diff>

<commit_message>
Add 32 bit float for clarity
</commit_message>
<xml_diff>
--- a/Data_types and variables/Datatypes_variables.pptx
+++ b/Data_types and variables/Datatypes_variables.pptx
@@ -5602,7 +5602,7 @@
                   </a:outerShdw>
                 </a:effectLst>
               </a:rPr>
-              <a:t>How float value is represented </a:t>
+              <a:t>How 32 bit float value is represented </a:t>
             </a:r>
           </a:p>
         </p:txBody>
@@ -6164,13 +6164,8 @@
           <a:p>
             <a:r>
               <a:rPr lang="en-US" dirty="0"/>
-              <a:t>	- “” empty string </a:t>
-            </a:r>
-            <a:r>
-              <a:rPr lang="en-US"/>
-              <a:t>for strings</a:t>
-            </a:r>
-            <a:endParaRPr lang="en-US" dirty="0"/>
+              <a:t>	- “” empty string for strings</a:t>
+            </a:r>
           </a:p>
         </p:txBody>
       </p:sp>

</xml_diff>

<commit_message>
Add commas to separate places
</commit_message>
<xml_diff>
--- a/Data_types and variables/Datatypes_variables.pptx
+++ b/Data_types and variables/Datatypes_variables.pptx
@@ -3599,13 +3599,8 @@
             <a:pPr lvl="1"/>
             <a:r>
               <a:rPr lang="en-US" dirty="0"/>
-              <a:t>Signed = the number is </a:t>
-            </a:r>
-            <a:r>
-              <a:rPr lang="en-US"/>
-              <a:t>always positive.</a:t>
-            </a:r>
-            <a:endParaRPr lang="en-US" dirty="0"/>
+              <a:t>Signed = the number is always zero or positive.</a:t>
+            </a:r>
           </a:p>
           <a:p>
             <a:pPr marL="502920" lvl="1" indent="0">
@@ -3615,6 +3610,36 @@
           </a:p>
         </p:txBody>
       </p:sp>
+      <p:pic>
+        <p:nvPicPr>
+          <p:cNvPr id="4" name="Picture 3">
+            <a:extLst>
+              <a:ext uri="{FF2B5EF4-FFF2-40B4-BE49-F238E27FC236}">
+                <a16:creationId xmlns:a16="http://schemas.microsoft.com/office/drawing/2014/main" id="{65DDB1C4-BB92-4868-AC70-4F87210B5F96}"/>
+              </a:ext>
+            </a:extLst>
+          </p:cNvPr>
+          <p:cNvPicPr>
+            <a:picLocks noChangeAspect="1"/>
+          </p:cNvPicPr>
+          <p:nvPr/>
+        </p:nvPicPr>
+        <p:blipFill>
+          <a:blip r:embed="rId2"/>
+          <a:stretch>
+            <a:fillRect/>
+          </a:stretch>
+        </p:blipFill>
+        <p:spPr>
+          <a:xfrm>
+            <a:off x="392874" y="4265023"/>
+            <a:ext cx="2286000" cy="2286000"/>
+          </a:xfrm>
+          <a:prstGeom prst="rect">
+            <a:avLst/>
+          </a:prstGeom>
+        </p:spPr>
+      </p:pic>
     </p:spTree>
     <p:extLst>
       <p:ext uri="{BB962C8B-B14F-4D97-AF65-F5344CB8AC3E}">
@@ -5359,7 +5384,15 @@
           <a:p>
             <a:r>
               <a:rPr lang="en-US" dirty="0"/>
-              <a:t>An integer is signed so we have 2^31  = 2147483648 different combinations or values that can represented. (-2147483648 to 2147483647)</a:t>
+              <a:t>An integer is signed so we have 2^31  = 2,147,483,648 different combinations or values that can represented. </a:t>
+            </a:r>
+            <a:r>
+              <a:rPr lang="en-US"/>
+              <a:t>(-2,147,483,648 to 2,147,483,647</a:t>
+            </a:r>
+            <a:r>
+              <a:rPr lang="en-US" dirty="0"/>
+              <a:t>)</a:t>
             </a:r>
           </a:p>
           <a:p>
@@ -5382,6 +5415,36 @@
           </a:p>
         </p:txBody>
       </p:sp>
+      <p:pic>
+        <p:nvPicPr>
+          <p:cNvPr id="7" name="Picture 6">
+            <a:extLst>
+              <a:ext uri="{FF2B5EF4-FFF2-40B4-BE49-F238E27FC236}">
+                <a16:creationId xmlns:a16="http://schemas.microsoft.com/office/drawing/2014/main" id="{13E1223A-D900-4A25-8474-D50571976474}"/>
+              </a:ext>
+            </a:extLst>
+          </p:cNvPr>
+          <p:cNvPicPr>
+            <a:picLocks noChangeAspect="1"/>
+          </p:cNvPicPr>
+          <p:nvPr/>
+        </p:nvPicPr>
+        <p:blipFill>
+          <a:blip r:embed="rId2"/>
+          <a:stretch>
+            <a:fillRect/>
+          </a:stretch>
+        </p:blipFill>
+        <p:spPr>
+          <a:xfrm>
+            <a:off x="404750" y="4249363"/>
+            <a:ext cx="2286000" cy="2286000"/>
+          </a:xfrm>
+          <a:prstGeom prst="rect">
+            <a:avLst/>
+          </a:prstGeom>
+        </p:spPr>
+      </p:pic>
     </p:spTree>
     <p:extLst>
       <p:ext uri="{BB962C8B-B14F-4D97-AF65-F5344CB8AC3E}">
@@ -6021,6 +6084,36 @@
           </p:sp>
         </mc:Fallback>
       </mc:AlternateContent>
+      <p:pic>
+        <p:nvPicPr>
+          <p:cNvPr id="13" name="Picture 12">
+            <a:extLst>
+              <a:ext uri="{FF2B5EF4-FFF2-40B4-BE49-F238E27FC236}">
+                <a16:creationId xmlns:a16="http://schemas.microsoft.com/office/drawing/2014/main" id="{41C30C2A-F302-4FEC-B45A-542B7A558EC4}"/>
+              </a:ext>
+            </a:extLst>
+          </p:cNvPr>
+          <p:cNvPicPr>
+            <a:picLocks noChangeAspect="1"/>
+          </p:cNvPicPr>
+          <p:nvPr/>
+        </p:nvPicPr>
+        <p:blipFill>
+          <a:blip r:embed="rId4"/>
+          <a:stretch>
+            <a:fillRect/>
+          </a:stretch>
+        </p:blipFill>
+        <p:spPr>
+          <a:xfrm>
+            <a:off x="386937" y="4270961"/>
+            <a:ext cx="2286000" cy="2286000"/>
+          </a:xfrm>
+          <a:prstGeom prst="rect">
+            <a:avLst/>
+          </a:prstGeom>
+        </p:spPr>
+      </p:pic>
     </p:spTree>
     <p:extLst>
       <p:ext uri="{BB962C8B-B14F-4D97-AF65-F5344CB8AC3E}">
@@ -6169,6 +6262,36 @@
           </a:p>
         </p:txBody>
       </p:sp>
+      <p:pic>
+        <p:nvPicPr>
+          <p:cNvPr id="9" name="Picture 8">
+            <a:extLst>
+              <a:ext uri="{FF2B5EF4-FFF2-40B4-BE49-F238E27FC236}">
+                <a16:creationId xmlns:a16="http://schemas.microsoft.com/office/drawing/2014/main" id="{11E545BB-7038-4393-A7D1-8211D8EAFFF2}"/>
+              </a:ext>
+            </a:extLst>
+          </p:cNvPr>
+          <p:cNvPicPr>
+            <a:picLocks noChangeAspect="1"/>
+          </p:cNvPicPr>
+          <p:nvPr/>
+        </p:nvPicPr>
+        <p:blipFill>
+          <a:blip r:embed="rId3"/>
+          <a:stretch>
+            <a:fillRect/>
+          </a:stretch>
+        </p:blipFill>
+        <p:spPr>
+          <a:xfrm>
+            <a:off x="422563" y="4270960"/>
+            <a:ext cx="2286000" cy="2286000"/>
+          </a:xfrm>
+          <a:prstGeom prst="rect">
+            <a:avLst/>
+          </a:prstGeom>
+        </p:spPr>
+      </p:pic>
     </p:spTree>
     <p:extLst>
       <p:ext uri="{BB962C8B-B14F-4D97-AF65-F5344CB8AC3E}">

</xml_diff>